<commit_message>
minor update to documentation
</commit_message>
<xml_diff>
--- a/script_relationships.pptx
+++ b/script_relationships.pptx
@@ -261,7 +261,7 @@
           <a:p>
             <a:fld id="{0E339DDD-9EE9-44F5-8997-0932F1FFC27B}" type="datetimeFigureOut">
               <a:rPr lang="en-ZA" smtClean="0"/>
-              <a:t>2024/06/21</a:t>
+              <a:t>2024/06/24</a:t>
             </a:fld>
             <a:endParaRPr lang="en-ZA"/>
           </a:p>
@@ -461,7 +461,7 @@
           <a:p>
             <a:fld id="{0E339DDD-9EE9-44F5-8997-0932F1FFC27B}" type="datetimeFigureOut">
               <a:rPr lang="en-ZA" smtClean="0"/>
-              <a:t>2024/06/21</a:t>
+              <a:t>2024/06/24</a:t>
             </a:fld>
             <a:endParaRPr lang="en-ZA"/>
           </a:p>
@@ -671,7 +671,7 @@
           <a:p>
             <a:fld id="{0E339DDD-9EE9-44F5-8997-0932F1FFC27B}" type="datetimeFigureOut">
               <a:rPr lang="en-ZA" smtClean="0"/>
-              <a:t>2024/06/21</a:t>
+              <a:t>2024/06/24</a:t>
             </a:fld>
             <a:endParaRPr lang="en-ZA"/>
           </a:p>
@@ -871,7 +871,7 @@
           <a:p>
             <a:fld id="{0E339DDD-9EE9-44F5-8997-0932F1FFC27B}" type="datetimeFigureOut">
               <a:rPr lang="en-ZA" smtClean="0"/>
-              <a:t>2024/06/21</a:t>
+              <a:t>2024/06/24</a:t>
             </a:fld>
             <a:endParaRPr lang="en-ZA"/>
           </a:p>
@@ -1147,7 +1147,7 @@
           <a:p>
             <a:fld id="{0E339DDD-9EE9-44F5-8997-0932F1FFC27B}" type="datetimeFigureOut">
               <a:rPr lang="en-ZA" smtClean="0"/>
-              <a:t>2024/06/21</a:t>
+              <a:t>2024/06/24</a:t>
             </a:fld>
             <a:endParaRPr lang="en-ZA"/>
           </a:p>
@@ -1415,7 +1415,7 @@
           <a:p>
             <a:fld id="{0E339DDD-9EE9-44F5-8997-0932F1FFC27B}" type="datetimeFigureOut">
               <a:rPr lang="en-ZA" smtClean="0"/>
-              <a:t>2024/06/21</a:t>
+              <a:t>2024/06/24</a:t>
             </a:fld>
             <a:endParaRPr lang="en-ZA"/>
           </a:p>
@@ -1830,7 +1830,7 @@
           <a:p>
             <a:fld id="{0E339DDD-9EE9-44F5-8997-0932F1FFC27B}" type="datetimeFigureOut">
               <a:rPr lang="en-ZA" smtClean="0"/>
-              <a:t>2024/06/21</a:t>
+              <a:t>2024/06/24</a:t>
             </a:fld>
             <a:endParaRPr lang="en-ZA"/>
           </a:p>
@@ -1972,7 +1972,7 @@
           <a:p>
             <a:fld id="{0E339DDD-9EE9-44F5-8997-0932F1FFC27B}" type="datetimeFigureOut">
               <a:rPr lang="en-ZA" smtClean="0"/>
-              <a:t>2024/06/21</a:t>
+              <a:t>2024/06/24</a:t>
             </a:fld>
             <a:endParaRPr lang="en-ZA"/>
           </a:p>
@@ -2085,7 +2085,7 @@
           <a:p>
             <a:fld id="{0E339DDD-9EE9-44F5-8997-0932F1FFC27B}" type="datetimeFigureOut">
               <a:rPr lang="en-ZA" smtClean="0"/>
-              <a:t>2024/06/21</a:t>
+              <a:t>2024/06/24</a:t>
             </a:fld>
             <a:endParaRPr lang="en-ZA"/>
           </a:p>
@@ -2398,7 +2398,7 @@
           <a:p>
             <a:fld id="{0E339DDD-9EE9-44F5-8997-0932F1FFC27B}" type="datetimeFigureOut">
               <a:rPr lang="en-ZA" smtClean="0"/>
-              <a:t>2024/06/21</a:t>
+              <a:t>2024/06/24</a:t>
             </a:fld>
             <a:endParaRPr lang="en-ZA"/>
           </a:p>
@@ -2687,7 +2687,7 @@
           <a:p>
             <a:fld id="{0E339DDD-9EE9-44F5-8997-0932F1FFC27B}" type="datetimeFigureOut">
               <a:rPr lang="en-ZA" smtClean="0"/>
-              <a:t>2024/06/21</a:t>
+              <a:t>2024/06/24</a:t>
             </a:fld>
             <a:endParaRPr lang="en-ZA"/>
           </a:p>
@@ -2930,7 +2930,7 @@
           <a:p>
             <a:fld id="{0E339DDD-9EE9-44F5-8997-0932F1FFC27B}" type="datetimeFigureOut">
               <a:rPr lang="en-ZA" smtClean="0"/>
-              <a:t>2024/06/21</a:t>
+              <a:t>2024/06/24</a:t>
             </a:fld>
             <a:endParaRPr lang="en-ZA"/>
           </a:p>
@@ -3434,7 +3434,15 @@
             <a:pPr algn="ctr"/>
             <a:r>
               <a:rPr lang="en-US" sz="900" dirty="0"/>
-              <a:t>UKBMS from David Roy</a:t>
+              <a:t>UKBMS from David Roy (</a:t>
+            </a:r>
+            <a:r>
+              <a:rPr lang="en-US" sz="900" dirty="0" err="1"/>
+              <a:t>CSV_Data</a:t>
+            </a:r>
+            <a:r>
+              <a:rPr lang="en-US" sz="900" dirty="0"/>
+              <a:t>)</a:t>
             </a:r>
           </a:p>
           <a:p>
@@ -3984,8 +3992,8 @@
         </p:nvSpPr>
         <p:spPr>
           <a:xfrm>
-            <a:off x="2561593" y="2328764"/>
-            <a:ext cx="1412336" cy="940632"/>
+            <a:off x="2357933" y="2343709"/>
+            <a:ext cx="1163127" cy="811860"/>
           </a:xfrm>
           <a:prstGeom prst="flowChartDecision">
             <a:avLst/>
@@ -4013,10 +4021,10 @@
           <a:p>
             <a:pPr algn="ctr"/>
             <a:r>
-              <a:rPr lang="en-US" sz="1000"/>
+              <a:rPr lang="en-US" sz="800"/>
               <a:t>Process_csv_data.Rmd</a:t>
             </a:r>
-            <a:endParaRPr lang="en-ZA" sz="1000" dirty="0"/>
+            <a:endParaRPr lang="en-ZA" sz="800" dirty="0"/>
           </a:p>
         </p:txBody>
       </p:sp>
@@ -4039,7 +4047,7 @@
         <p:spPr>
           <a:xfrm>
             <a:off x="2733283" y="1083848"/>
-            <a:ext cx="534478" cy="1244916"/>
+            <a:ext cx="206214" cy="1259861"/>
           </a:xfrm>
           <a:prstGeom prst="straightConnector1">
             <a:avLst/>
@@ -4077,8 +4085,8 @@
         </p:nvSpPr>
         <p:spPr>
           <a:xfrm>
-            <a:off x="2541751" y="4530624"/>
-            <a:ext cx="1412336" cy="940632"/>
+            <a:off x="2358657" y="4691450"/>
+            <a:ext cx="1163127" cy="811860"/>
           </a:xfrm>
           <a:prstGeom prst="flowChartDecision">
             <a:avLst/>
@@ -4106,22 +4114,22 @@
           <a:p>
             <a:pPr algn="ctr"/>
             <a:r>
-              <a:rPr lang="en-US" sz="1000" dirty="0" err="1"/>
+              <a:rPr lang="en-US" sz="800" dirty="0" err="1"/>
               <a:t>Butterflies_combine_</a:t>
             </a:r>
             <a:r>
-              <a:rPr lang="en-US" sz="1000" err="1"/>
+              <a:rPr lang="en-US" sz="800" err="1"/>
               <a:t>env</a:t>
             </a:r>
             <a:r>
-              <a:rPr lang="en-US" sz="1000"/>
+              <a:rPr lang="en-US" sz="800"/>
               <a:t>_data.</a:t>
             </a:r>
             <a:r>
-              <a:rPr lang="en-US" sz="1000" dirty="0" err="1"/>
+              <a:rPr lang="en-US" sz="800" dirty="0" err="1"/>
               <a:t>Rmd</a:t>
             </a:r>
-            <a:endParaRPr lang="en-ZA" sz="1000" dirty="0"/>
+            <a:endParaRPr lang="en-ZA" sz="800" dirty="0"/>
           </a:p>
         </p:txBody>
       </p:sp>
@@ -4139,8 +4147,8 @@
         </p:nvSpPr>
         <p:spPr>
           <a:xfrm>
-            <a:off x="2845039" y="3543908"/>
-            <a:ext cx="805760" cy="733936"/>
+            <a:off x="2599620" y="3631241"/>
+            <a:ext cx="663582" cy="633461"/>
           </a:xfrm>
           <a:prstGeom prst="flowChartProcess">
             <a:avLst/>
@@ -4168,13 +4176,22 @@
           <a:p>
             <a:pPr algn="ctr"/>
             <a:r>
-              <a:rPr lang="en-ZA" sz="900" dirty="0"/>
-              <a:t>Partly processed data</a:t>
-            </a:r>
+              <a:rPr lang="en-ZA" sz="700" dirty="0"/>
+              <a:t>Partly processed data: </a:t>
+            </a:r>
+            <a:r>
+              <a:rPr lang="en-ZA" sz="700" dirty="0" err="1"/>
+              <a:t>spatial_ukbms_obs_sites_spp.Rds</a:t>
+            </a:r>
+            <a:endParaRPr lang="en-ZA" sz="700" dirty="0"/>
           </a:p>
           <a:p>
             <a:pPr algn="ctr"/>
-            <a:endParaRPr lang="en-ZA" sz="900" dirty="0"/>
+            <a:endParaRPr lang="en-ZA" sz="700" dirty="0"/>
+          </a:p>
+          <a:p>
+            <a:pPr algn="ctr"/>
+            <a:endParaRPr lang="en-ZA" sz="700" dirty="0"/>
           </a:p>
         </p:txBody>
       </p:sp>
@@ -4196,8 +4213,8 @@
         </p:nvCxnSpPr>
         <p:spPr>
           <a:xfrm flipH="1">
-            <a:off x="3267761" y="936753"/>
-            <a:ext cx="702441" cy="1392011"/>
+            <a:off x="2939497" y="936753"/>
+            <a:ext cx="1030705" cy="1406956"/>
           </a:xfrm>
           <a:prstGeom prst="straightConnector1">
             <a:avLst/>
@@ -4239,8 +4256,8 @@
         </p:nvCxnSpPr>
         <p:spPr>
           <a:xfrm flipH="1">
-            <a:off x="3247919" y="3269396"/>
-            <a:ext cx="19842" cy="274512"/>
+            <a:off x="2931411" y="3155569"/>
+            <a:ext cx="8086" cy="475672"/>
           </a:xfrm>
           <a:prstGeom prst="straightConnector1">
             <a:avLst/>
@@ -4282,8 +4299,8 @@
         </p:nvCxnSpPr>
         <p:spPr>
           <a:xfrm>
-            <a:off x="3247919" y="4277844"/>
-            <a:ext cx="0" cy="252780"/>
+            <a:off x="2931411" y="4264702"/>
+            <a:ext cx="8810" cy="426748"/>
           </a:xfrm>
           <a:prstGeom prst="straightConnector1">
             <a:avLst/>
@@ -4321,7 +4338,7 @@
         </p:nvSpPr>
         <p:spPr>
           <a:xfrm>
-            <a:off x="2517693" y="5800583"/>
+            <a:off x="2204279" y="5800583"/>
             <a:ext cx="1412038" cy="811860"/>
           </a:xfrm>
           <a:prstGeom prst="flowChartProcess">
@@ -4404,8 +4421,8 @@
         </p:nvCxnSpPr>
         <p:spPr>
           <a:xfrm flipH="1">
-            <a:off x="3223712" y="5471256"/>
-            <a:ext cx="24207" cy="329327"/>
+            <a:off x="2910298" y="5503310"/>
+            <a:ext cx="29923" cy="297273"/>
           </a:xfrm>
           <a:prstGeom prst="straightConnector1">
             <a:avLst/>
@@ -5462,8 +5479,8 @@
         </p:nvCxnSpPr>
         <p:spPr>
           <a:xfrm flipV="1">
-            <a:off x="2129221" y="3910876"/>
-            <a:ext cx="715818" cy="141520"/>
+            <a:off x="2129221" y="3947972"/>
+            <a:ext cx="470399" cy="104424"/>
           </a:xfrm>
           <a:prstGeom prst="straightConnector1">
             <a:avLst/>
@@ -5501,7 +5518,7 @@
         </p:nvSpPr>
         <p:spPr>
           <a:xfrm flipH="1">
-            <a:off x="4138715" y="1439544"/>
+            <a:off x="3771346" y="1490170"/>
             <a:ext cx="98609" cy="4970178"/>
           </a:xfrm>
           <a:prstGeom prst="rightBrace">
@@ -5549,8 +5566,8 @@
         </p:nvCxnSpPr>
         <p:spPr>
           <a:xfrm>
-            <a:off x="3650799" y="3910876"/>
-            <a:ext cx="487916" cy="13757"/>
+            <a:off x="3263202" y="3947972"/>
+            <a:ext cx="508144" cy="27287"/>
           </a:xfrm>
           <a:prstGeom prst="straightConnector1">
             <a:avLst/>

</xml_diff>

<commit_message>
updated GAM and GAMM on pptx
</commit_message>
<xml_diff>
--- a/script_relationships.pptx
+++ b/script_relationships.pptx
@@ -261,7 +261,7 @@
           <a:p>
             <a:fld id="{0E339DDD-9EE9-44F5-8997-0932F1FFC27B}" type="datetimeFigureOut">
               <a:rPr lang="en-ZA" smtClean="0"/>
-              <a:t>2024/06/24</a:t>
+              <a:t>2024/10/22</a:t>
             </a:fld>
             <a:endParaRPr lang="en-ZA"/>
           </a:p>
@@ -461,7 +461,7 @@
           <a:p>
             <a:fld id="{0E339DDD-9EE9-44F5-8997-0932F1FFC27B}" type="datetimeFigureOut">
               <a:rPr lang="en-ZA" smtClean="0"/>
-              <a:t>2024/06/24</a:t>
+              <a:t>2024/10/22</a:t>
             </a:fld>
             <a:endParaRPr lang="en-ZA"/>
           </a:p>
@@ -671,7 +671,7 @@
           <a:p>
             <a:fld id="{0E339DDD-9EE9-44F5-8997-0932F1FFC27B}" type="datetimeFigureOut">
               <a:rPr lang="en-ZA" smtClean="0"/>
-              <a:t>2024/06/24</a:t>
+              <a:t>2024/10/22</a:t>
             </a:fld>
             <a:endParaRPr lang="en-ZA"/>
           </a:p>
@@ -871,7 +871,7 @@
           <a:p>
             <a:fld id="{0E339DDD-9EE9-44F5-8997-0932F1FFC27B}" type="datetimeFigureOut">
               <a:rPr lang="en-ZA" smtClean="0"/>
-              <a:t>2024/06/24</a:t>
+              <a:t>2024/10/22</a:t>
             </a:fld>
             <a:endParaRPr lang="en-ZA"/>
           </a:p>
@@ -1147,7 +1147,7 @@
           <a:p>
             <a:fld id="{0E339DDD-9EE9-44F5-8997-0932F1FFC27B}" type="datetimeFigureOut">
               <a:rPr lang="en-ZA" smtClean="0"/>
-              <a:t>2024/06/24</a:t>
+              <a:t>2024/10/22</a:t>
             </a:fld>
             <a:endParaRPr lang="en-ZA"/>
           </a:p>
@@ -1415,7 +1415,7 @@
           <a:p>
             <a:fld id="{0E339DDD-9EE9-44F5-8997-0932F1FFC27B}" type="datetimeFigureOut">
               <a:rPr lang="en-ZA" smtClean="0"/>
-              <a:t>2024/06/24</a:t>
+              <a:t>2024/10/22</a:t>
             </a:fld>
             <a:endParaRPr lang="en-ZA"/>
           </a:p>
@@ -1830,7 +1830,7 @@
           <a:p>
             <a:fld id="{0E339DDD-9EE9-44F5-8997-0932F1FFC27B}" type="datetimeFigureOut">
               <a:rPr lang="en-ZA" smtClean="0"/>
-              <a:t>2024/06/24</a:t>
+              <a:t>2024/10/22</a:t>
             </a:fld>
             <a:endParaRPr lang="en-ZA"/>
           </a:p>
@@ -1972,7 +1972,7 @@
           <a:p>
             <a:fld id="{0E339DDD-9EE9-44F5-8997-0932F1FFC27B}" type="datetimeFigureOut">
               <a:rPr lang="en-ZA" smtClean="0"/>
-              <a:t>2024/06/24</a:t>
+              <a:t>2024/10/22</a:t>
             </a:fld>
             <a:endParaRPr lang="en-ZA"/>
           </a:p>
@@ -2085,7 +2085,7 @@
           <a:p>
             <a:fld id="{0E339DDD-9EE9-44F5-8997-0932F1FFC27B}" type="datetimeFigureOut">
               <a:rPr lang="en-ZA" smtClean="0"/>
-              <a:t>2024/06/24</a:t>
+              <a:t>2024/10/22</a:t>
             </a:fld>
             <a:endParaRPr lang="en-ZA"/>
           </a:p>
@@ -2398,7 +2398,7 @@
           <a:p>
             <a:fld id="{0E339DDD-9EE9-44F5-8997-0932F1FFC27B}" type="datetimeFigureOut">
               <a:rPr lang="en-ZA" smtClean="0"/>
-              <a:t>2024/06/24</a:t>
+              <a:t>2024/10/22</a:t>
             </a:fld>
             <a:endParaRPr lang="en-ZA"/>
           </a:p>
@@ -2687,7 +2687,7 @@
           <a:p>
             <a:fld id="{0E339DDD-9EE9-44F5-8997-0932F1FFC27B}" type="datetimeFigureOut">
               <a:rPr lang="en-ZA" smtClean="0"/>
-              <a:t>2024/06/24</a:t>
+              <a:t>2024/10/22</a:t>
             </a:fld>
             <a:endParaRPr lang="en-ZA"/>
           </a:p>
@@ -2930,7 +2930,7 @@
           <a:p>
             <a:fld id="{0E339DDD-9EE9-44F5-8997-0932F1FFC27B}" type="datetimeFigureOut">
               <a:rPr lang="en-ZA" smtClean="0"/>
-              <a:t>2024/06/24</a:t>
+              <a:t>2024/10/22</a:t>
             </a:fld>
             <a:endParaRPr lang="en-ZA"/>
           </a:p>
@@ -4460,7 +4460,7 @@
         </p:nvSpPr>
         <p:spPr>
           <a:xfrm>
-            <a:off x="4645748" y="3151212"/>
+            <a:off x="4566576" y="3740848"/>
             <a:ext cx="1198364" cy="678063"/>
           </a:xfrm>
           <a:prstGeom prst="flowChartDecision">
@@ -4687,10 +4687,10 @@
       </p:sp>
       <p:sp>
         <p:nvSpPr>
-          <p:cNvPr id="9" name="Flowchart: Decision 8">
-            <a:extLst>
-              <a:ext uri="{FF2B5EF4-FFF2-40B4-BE49-F238E27FC236}">
-                <a16:creationId xmlns:a16="http://schemas.microsoft.com/office/drawing/2014/main" id="{1AA0AEFF-E0B5-9C25-05D1-26EBD06E17B4}"/>
+          <p:cNvPr id="10" name="Flowchart: Decision 9">
+            <a:extLst>
+              <a:ext uri="{FF2B5EF4-FFF2-40B4-BE49-F238E27FC236}">
+                <a16:creationId xmlns:a16="http://schemas.microsoft.com/office/drawing/2014/main" id="{ABDCC353-115F-85A6-55BF-A54512959EA8}"/>
               </a:ext>
             </a:extLst>
           </p:cNvPr>
@@ -4699,7 +4699,7 @@
         </p:nvSpPr>
         <p:spPr>
           <a:xfrm>
-            <a:off x="7268890" y="3765038"/>
+            <a:off x="5985364" y="2356932"/>
             <a:ext cx="1198364" cy="678063"/>
           </a:xfrm>
           <a:prstGeom prst="flowChartDecision">
@@ -4738,7 +4738,7 @@
                   <a:srgbClr val="7030A0"/>
                 </a:solidFill>
               </a:rPr>
-              <a:t>Process_GAMM_analyses.Rmd</a:t>
+              <a:t>Zeta_declines_deacys_analyses.Rmd</a:t>
             </a:r>
             <a:endParaRPr lang="en-ZA" sz="600" dirty="0">
               <a:solidFill>
@@ -4750,10 +4750,10 @@
       </p:sp>
       <p:sp>
         <p:nvSpPr>
-          <p:cNvPr id="10" name="Flowchart: Decision 9">
-            <a:extLst>
-              <a:ext uri="{FF2B5EF4-FFF2-40B4-BE49-F238E27FC236}">
-                <a16:creationId xmlns:a16="http://schemas.microsoft.com/office/drawing/2014/main" id="{ABDCC353-115F-85A6-55BF-A54512959EA8}"/>
+          <p:cNvPr id="11" name="Flowchart: Decision 10">
+            <a:extLst>
+              <a:ext uri="{FF2B5EF4-FFF2-40B4-BE49-F238E27FC236}">
+                <a16:creationId xmlns:a16="http://schemas.microsoft.com/office/drawing/2014/main" id="{14364913-0635-C6AB-5221-029BED38B0A7}"/>
               </a:ext>
             </a:extLst>
           </p:cNvPr>
@@ -4762,17 +4762,12 @@
         </p:nvSpPr>
         <p:spPr>
           <a:xfrm>
-            <a:off x="5985364" y="2356932"/>
-            <a:ext cx="1198364" cy="678063"/>
+            <a:off x="10200595" y="4704129"/>
+            <a:ext cx="1188223" cy="484000"/>
           </a:xfrm>
           <a:prstGeom prst="flowChartDecision">
             <a:avLst/>
           </a:prstGeom>
-          <a:ln>
-            <a:solidFill>
-              <a:srgbClr val="7030A0"/>
-            </a:solidFill>
-          </a:ln>
         </p:spPr>
         <p:style>
           <a:lnRef idx="2">
@@ -4796,27 +4791,27 @@
           <a:p>
             <a:pPr algn="ctr"/>
             <a:r>
-              <a:rPr lang="en-US" sz="600" dirty="0" err="1">
-                <a:solidFill>
-                  <a:srgbClr val="7030A0"/>
-                </a:solidFill>
-              </a:rPr>
-              <a:t>Zeta_declines_deacys_analyses.Rmd</a:t>
-            </a:r>
-            <a:endParaRPr lang="en-ZA" sz="600" dirty="0">
-              <a:solidFill>
-                <a:srgbClr val="7030A0"/>
-              </a:solidFill>
-            </a:endParaRPr>
-          </a:p>
-        </p:txBody>
-      </p:sp>
-      <p:sp>
-        <p:nvSpPr>
-          <p:cNvPr id="11" name="Flowchart: Decision 10">
-            <a:extLst>
-              <a:ext uri="{FF2B5EF4-FFF2-40B4-BE49-F238E27FC236}">
-                <a16:creationId xmlns:a16="http://schemas.microsoft.com/office/drawing/2014/main" id="{14364913-0635-C6AB-5221-029BED38B0A7}"/>
+              <a:rPr lang="en-ZA" sz="600" dirty="0" err="1"/>
+              <a:t>generate_code_chunks_for_supp_report</a:t>
+            </a:r>
+            <a:r>
+              <a:rPr lang="en-US" sz="600" dirty="0"/>
+              <a:t>.</a:t>
+            </a:r>
+            <a:r>
+              <a:rPr lang="en-US" sz="600" dirty="0" err="1"/>
+              <a:t>Rmd</a:t>
+            </a:r>
+            <a:endParaRPr lang="en-ZA" sz="600" dirty="0"/>
+          </a:p>
+        </p:txBody>
+      </p:sp>
+      <p:sp>
+        <p:nvSpPr>
+          <p:cNvPr id="16" name="Flowchart: Process 15">
+            <a:extLst>
+              <a:ext uri="{FF2B5EF4-FFF2-40B4-BE49-F238E27FC236}">
+                <a16:creationId xmlns:a16="http://schemas.microsoft.com/office/drawing/2014/main" id="{310CEE41-7F86-9634-15F0-2B704D38084F}"/>
               </a:ext>
             </a:extLst>
           </p:cNvPr>
@@ -4825,8 +4820,370 @@
         </p:nvSpPr>
         <p:spPr>
           <a:xfrm>
-            <a:off x="10200595" y="4704129"/>
-            <a:ext cx="1188223" cy="484000"/>
+            <a:off x="11257012" y="4078523"/>
+            <a:ext cx="871372" cy="533201"/>
+          </a:xfrm>
+          <a:prstGeom prst="flowChartProcess">
+            <a:avLst/>
+          </a:prstGeom>
+          <a:solidFill>
+            <a:srgbClr val="000000"/>
+          </a:solidFill>
+        </p:spPr>
+        <p:style>
+          <a:lnRef idx="2">
+            <a:schemeClr val="accent4">
+              <a:shade val="15000"/>
+            </a:schemeClr>
+          </a:lnRef>
+          <a:fillRef idx="1">
+            <a:schemeClr val="accent4"/>
+          </a:fillRef>
+          <a:effectRef idx="0">
+            <a:schemeClr val="accent4"/>
+          </a:effectRef>
+          <a:fontRef idx="minor">
+            <a:schemeClr val="lt1"/>
+          </a:fontRef>
+        </p:style>
+        <p:txBody>
+          <a:bodyPr rtlCol="0" anchor="ctr"/>
+          <a:lstStyle/>
+          <a:p>
+            <a:pPr algn="ctr"/>
+            <a:r>
+              <a:rPr lang="en-ZA" sz="900" dirty="0"/>
+              <a:t>Results Markdown Report</a:t>
+            </a:r>
+          </a:p>
+          <a:p>
+            <a:pPr algn="ctr"/>
+            <a:endParaRPr lang="en-ZA" sz="900" dirty="0"/>
+          </a:p>
+        </p:txBody>
+      </p:sp>
+      <p:sp>
+        <p:nvSpPr>
+          <p:cNvPr id="25" name="Flowchart: Process 24">
+            <a:extLst>
+              <a:ext uri="{FF2B5EF4-FFF2-40B4-BE49-F238E27FC236}">
+                <a16:creationId xmlns:a16="http://schemas.microsoft.com/office/drawing/2014/main" id="{D00F3089-D084-30FC-5896-D00F781FDFD3}"/>
+              </a:ext>
+            </a:extLst>
+          </p:cNvPr>
+          <p:cNvSpPr/>
+          <p:nvPr/>
+        </p:nvSpPr>
+        <p:spPr>
+          <a:xfrm>
+            <a:off x="6320372" y="4193008"/>
+            <a:ext cx="882106" cy="557777"/>
+          </a:xfrm>
+          <a:prstGeom prst="flowChartProcess">
+            <a:avLst/>
+          </a:prstGeom>
+        </p:spPr>
+        <p:style>
+          <a:lnRef idx="2">
+            <a:schemeClr val="accent4">
+              <a:shade val="15000"/>
+            </a:schemeClr>
+          </a:lnRef>
+          <a:fillRef idx="1">
+            <a:schemeClr val="accent4"/>
+          </a:fillRef>
+          <a:effectRef idx="0">
+            <a:schemeClr val="accent4"/>
+          </a:effectRef>
+          <a:fontRef idx="minor">
+            <a:schemeClr val="lt1"/>
+          </a:fontRef>
+        </p:style>
+        <p:txBody>
+          <a:bodyPr rtlCol="0" anchor="ctr"/>
+          <a:lstStyle/>
+          <a:p>
+            <a:pPr algn="ctr"/>
+            <a:r>
+              <a:rPr lang="en-ZA" sz="600" dirty="0"/>
+              <a:t>GAMM output</a:t>
+            </a:r>
+          </a:p>
+          <a:p>
+            <a:pPr algn="ctr"/>
+            <a:r>
+              <a:rPr lang="en-ZA" sz="600" dirty="0"/>
+              <a:t>…_</a:t>
+            </a:r>
+            <a:r>
+              <a:rPr lang="en-ZA" sz="600" dirty="0" err="1"/>
+              <a:t>gamm_input.Rds</a:t>
+            </a:r>
+            <a:endParaRPr lang="en-ZA" sz="600" dirty="0"/>
+          </a:p>
+          <a:p>
+            <a:pPr algn="ctr"/>
+            <a:r>
+              <a:rPr lang="en-US" sz="600" dirty="0"/>
+              <a:t>…</a:t>
+            </a:r>
+            <a:r>
+              <a:rPr lang="en-US" sz="600" dirty="0" err="1"/>
+              <a:t>gamm_cor_struct_compare.rds</a:t>
+            </a:r>
+            <a:endParaRPr lang="en-ZA" sz="600" dirty="0"/>
+          </a:p>
+          <a:p>
+            <a:pPr algn="ctr"/>
+            <a:endParaRPr lang="en-ZA" sz="600" dirty="0"/>
+          </a:p>
+        </p:txBody>
+      </p:sp>
+      <p:cxnSp>
+        <p:nvCxnSpPr>
+          <p:cNvPr id="36" name="Straight Arrow Connector 35">
+            <a:extLst>
+              <a:ext uri="{FF2B5EF4-FFF2-40B4-BE49-F238E27FC236}">
+                <a16:creationId xmlns:a16="http://schemas.microsoft.com/office/drawing/2014/main" id="{400374F4-B1E8-F0F4-07FD-0353BC6BCFA5}"/>
+              </a:ext>
+            </a:extLst>
+          </p:cNvPr>
+          <p:cNvCxnSpPr>
+            <a:cxnSpLocks/>
+            <a:stCxn id="75" idx="3"/>
+            <a:endCxn id="25" idx="0"/>
+          </p:cNvCxnSpPr>
+          <p:nvPr/>
+        </p:nvCxnSpPr>
+        <p:spPr>
+          <a:xfrm flipH="1">
+            <a:off x="6761425" y="3530960"/>
+            <a:ext cx="458436" cy="662048"/>
+          </a:xfrm>
+          <a:prstGeom prst="straightConnector1">
+            <a:avLst/>
+          </a:prstGeom>
+          <a:ln>
+            <a:tailEnd type="triangle"/>
+          </a:ln>
+        </p:spPr>
+        <p:style>
+          <a:lnRef idx="2">
+            <a:schemeClr val="accent1"/>
+          </a:lnRef>
+          <a:fillRef idx="0">
+            <a:schemeClr val="accent1"/>
+          </a:fillRef>
+          <a:effectRef idx="1">
+            <a:schemeClr val="accent1"/>
+          </a:effectRef>
+          <a:fontRef idx="minor">
+            <a:schemeClr val="tx1"/>
+          </a:fontRef>
+        </p:style>
+      </p:cxnSp>
+      <p:cxnSp>
+        <p:nvCxnSpPr>
+          <p:cNvPr id="37" name="Straight Arrow Connector 36">
+            <a:extLst>
+              <a:ext uri="{FF2B5EF4-FFF2-40B4-BE49-F238E27FC236}">
+                <a16:creationId xmlns:a16="http://schemas.microsoft.com/office/drawing/2014/main" id="{035214D3-8CBA-77F0-9A80-2F74313564A8}"/>
+              </a:ext>
+            </a:extLst>
+          </p:cNvPr>
+          <p:cNvCxnSpPr>
+            <a:cxnSpLocks/>
+            <a:stCxn id="25" idx="3"/>
+            <a:endCxn id="9" idx="2"/>
+          </p:cNvCxnSpPr>
+          <p:nvPr/>
+        </p:nvCxnSpPr>
+        <p:spPr>
+          <a:xfrm flipV="1">
+            <a:off x="7202478" y="4352544"/>
+            <a:ext cx="872385" cy="119353"/>
+          </a:xfrm>
+          <a:prstGeom prst="straightConnector1">
+            <a:avLst/>
+          </a:prstGeom>
+          <a:ln>
+            <a:tailEnd type="triangle"/>
+          </a:ln>
+        </p:spPr>
+        <p:style>
+          <a:lnRef idx="2">
+            <a:schemeClr val="accent1"/>
+          </a:lnRef>
+          <a:fillRef idx="0">
+            <a:schemeClr val="accent1"/>
+          </a:fillRef>
+          <a:effectRef idx="1">
+            <a:schemeClr val="accent1"/>
+          </a:effectRef>
+          <a:fontRef idx="minor">
+            <a:schemeClr val="tx1"/>
+          </a:fontRef>
+        </p:style>
+      </p:cxnSp>
+      <p:sp>
+        <p:nvSpPr>
+          <p:cNvPr id="39" name="Flowchart: Process 38">
+            <a:extLst>
+              <a:ext uri="{FF2B5EF4-FFF2-40B4-BE49-F238E27FC236}">
+                <a16:creationId xmlns:a16="http://schemas.microsoft.com/office/drawing/2014/main" id="{6348209E-B6A1-9676-A1B8-D72A245A09B9}"/>
+              </a:ext>
+            </a:extLst>
+          </p:cNvPr>
+          <p:cNvSpPr/>
+          <p:nvPr/>
+        </p:nvSpPr>
+        <p:spPr>
+          <a:xfrm>
+            <a:off x="6232948" y="5191318"/>
+            <a:ext cx="812638" cy="364271"/>
+          </a:xfrm>
+          <a:prstGeom prst="flowChartProcess">
+            <a:avLst/>
+          </a:prstGeom>
+        </p:spPr>
+        <p:style>
+          <a:lnRef idx="2">
+            <a:schemeClr val="accent4">
+              <a:shade val="15000"/>
+            </a:schemeClr>
+          </a:lnRef>
+          <a:fillRef idx="1">
+            <a:schemeClr val="accent4"/>
+          </a:fillRef>
+          <a:effectRef idx="0">
+            <a:schemeClr val="accent4"/>
+          </a:effectRef>
+          <a:fontRef idx="minor">
+            <a:schemeClr val="lt1"/>
+          </a:fontRef>
+        </p:style>
+        <p:txBody>
+          <a:bodyPr rtlCol="0" anchor="ctr"/>
+          <a:lstStyle/>
+          <a:p>
+            <a:pPr algn="ctr"/>
+            <a:r>
+              <a:rPr lang="en-ZA" sz="700" dirty="0" err="1"/>
+              <a:t>Msgdm</a:t>
+            </a:r>
+            <a:r>
+              <a:rPr lang="en-ZA" sz="700" dirty="0"/>
+              <a:t> output</a:t>
+            </a:r>
+          </a:p>
+          <a:p>
+            <a:pPr algn="ctr"/>
+            <a:endParaRPr lang="en-ZA" sz="700" dirty="0"/>
+          </a:p>
+        </p:txBody>
+      </p:sp>
+      <p:cxnSp>
+        <p:nvCxnSpPr>
+          <p:cNvPr id="40" name="Straight Arrow Connector 39">
+            <a:extLst>
+              <a:ext uri="{FF2B5EF4-FFF2-40B4-BE49-F238E27FC236}">
+                <a16:creationId xmlns:a16="http://schemas.microsoft.com/office/drawing/2014/main" id="{CE1B6F74-2681-827A-F7CD-3E26946A52EF}"/>
+              </a:ext>
+            </a:extLst>
+          </p:cNvPr>
+          <p:cNvCxnSpPr>
+            <a:cxnSpLocks/>
+            <a:stCxn id="6" idx="3"/>
+            <a:endCxn id="39" idx="1"/>
+          </p:cNvCxnSpPr>
+          <p:nvPr/>
+        </p:nvCxnSpPr>
+        <p:spPr>
+          <a:xfrm>
+            <a:off x="5881305" y="5327744"/>
+            <a:ext cx="351643" cy="45710"/>
+          </a:xfrm>
+          <a:prstGeom prst="straightConnector1">
+            <a:avLst/>
+          </a:prstGeom>
+          <a:ln>
+            <a:tailEnd type="triangle"/>
+          </a:ln>
+        </p:spPr>
+        <p:style>
+          <a:lnRef idx="2">
+            <a:schemeClr val="accent1"/>
+          </a:lnRef>
+          <a:fillRef idx="0">
+            <a:schemeClr val="accent1"/>
+          </a:fillRef>
+          <a:effectRef idx="1">
+            <a:schemeClr val="accent1"/>
+          </a:effectRef>
+          <a:fontRef idx="minor">
+            <a:schemeClr val="tx1"/>
+          </a:fontRef>
+        </p:style>
+      </p:cxnSp>
+      <p:cxnSp>
+        <p:nvCxnSpPr>
+          <p:cNvPr id="41" name="Straight Arrow Connector 40">
+            <a:extLst>
+              <a:ext uri="{FF2B5EF4-FFF2-40B4-BE49-F238E27FC236}">
+                <a16:creationId xmlns:a16="http://schemas.microsoft.com/office/drawing/2014/main" id="{725E58FE-2A86-9221-80CB-B73A3F2D8E82}"/>
+              </a:ext>
+            </a:extLst>
+          </p:cNvPr>
+          <p:cNvCxnSpPr>
+            <a:cxnSpLocks/>
+            <a:stCxn id="39" idx="3"/>
+            <a:endCxn id="3" idx="0"/>
+          </p:cNvCxnSpPr>
+          <p:nvPr/>
+        </p:nvCxnSpPr>
+        <p:spPr>
+          <a:xfrm flipV="1">
+            <a:off x="7045586" y="5097647"/>
+            <a:ext cx="882106" cy="275807"/>
+          </a:xfrm>
+          <a:prstGeom prst="straightConnector1">
+            <a:avLst/>
+          </a:prstGeom>
+          <a:ln>
+            <a:tailEnd type="triangle"/>
+          </a:ln>
+        </p:spPr>
+        <p:style>
+          <a:lnRef idx="2">
+            <a:schemeClr val="accent1"/>
+          </a:lnRef>
+          <a:fillRef idx="0">
+            <a:schemeClr val="accent1"/>
+          </a:fillRef>
+          <a:effectRef idx="1">
+            <a:schemeClr val="accent1"/>
+          </a:effectRef>
+          <a:fontRef idx="minor">
+            <a:schemeClr val="tx1"/>
+          </a:fontRef>
+        </p:style>
+      </p:cxnSp>
+      <p:sp>
+        <p:nvSpPr>
+          <p:cNvPr id="75" name="Flowchart: Decision 74">
+            <a:extLst>
+              <a:ext uri="{FF2B5EF4-FFF2-40B4-BE49-F238E27FC236}">
+                <a16:creationId xmlns:a16="http://schemas.microsoft.com/office/drawing/2014/main" id="{7C93B17A-EF2D-AB60-2BDF-DD00A8440548}"/>
+              </a:ext>
+            </a:extLst>
+          </p:cNvPr>
+          <p:cNvSpPr/>
+          <p:nvPr/>
+        </p:nvSpPr>
+        <p:spPr>
+          <a:xfrm>
+            <a:off x="6021497" y="3191928"/>
+            <a:ext cx="1198364" cy="678063"/>
           </a:xfrm>
           <a:prstGeom prst="flowChartDecision">
             <a:avLst/>
@@ -4854,16 +5211,8 @@
           <a:p>
             <a:pPr algn="ctr"/>
             <a:r>
-              <a:rPr lang="en-ZA" sz="600" dirty="0" err="1"/>
-              <a:t>generate_code_chunks_for_supp_report</a:t>
-            </a:r>
-            <a:r>
-              <a:rPr lang="en-US" sz="600" dirty="0"/>
-              <a:t>.</a:t>
-            </a:r>
-            <a:r>
               <a:rPr lang="en-US" sz="600" dirty="0" err="1"/>
-              <a:t>Rmd</a:t>
+              <a:t>GAMM_compare_corstructs_analyses.Rmd</a:t>
             </a:r>
             <a:endParaRPr lang="en-ZA" sz="600" dirty="0"/>
           </a:p>
@@ -4871,10 +5220,10 @@
       </p:sp>
       <p:sp>
         <p:nvSpPr>
-          <p:cNvPr id="16" name="Flowchart: Process 15">
-            <a:extLst>
-              <a:ext uri="{FF2B5EF4-FFF2-40B4-BE49-F238E27FC236}">
-                <a16:creationId xmlns:a16="http://schemas.microsoft.com/office/drawing/2014/main" id="{310CEE41-7F86-9634-15F0-2B704D38084F}"/>
+          <p:cNvPr id="83" name="Right Brace 82">
+            <a:extLst>
+              <a:ext uri="{FF2B5EF4-FFF2-40B4-BE49-F238E27FC236}">
+                <a16:creationId xmlns:a16="http://schemas.microsoft.com/office/drawing/2014/main" id="{2B5C80FE-1B9A-1684-18D4-4E8E4617C5B2}"/>
               </a:ext>
             </a:extLst>
           </p:cNvPr>
@@ -4883,15 +5232,1260 @@
         </p:nvSpPr>
         <p:spPr>
           <a:xfrm>
-            <a:off x="11257012" y="4078523"/>
-            <a:ext cx="871372" cy="533201"/>
-          </a:xfrm>
-          <a:prstGeom prst="flowChartProcess">
+            <a:off x="1932054" y="1555832"/>
+            <a:ext cx="197167" cy="4993128"/>
+          </a:xfrm>
+          <a:prstGeom prst="rightBrace">
+            <a:avLst/>
+          </a:prstGeom>
+        </p:spPr>
+        <p:style>
+          <a:lnRef idx="2">
+            <a:schemeClr val="accent1"/>
+          </a:lnRef>
+          <a:fillRef idx="0">
+            <a:schemeClr val="accent1"/>
+          </a:fillRef>
+          <a:effectRef idx="1">
+            <a:schemeClr val="accent1"/>
+          </a:effectRef>
+          <a:fontRef idx="minor">
+            <a:schemeClr val="tx1"/>
+          </a:fontRef>
+        </p:style>
+        <p:txBody>
+          <a:bodyPr rtlCol="0" anchor="ctr"/>
+          <a:lstStyle/>
+          <a:p>
+            <a:pPr algn="ctr"/>
+            <a:endParaRPr lang="en-ZA"/>
+          </a:p>
+        </p:txBody>
+      </p:sp>
+      <p:sp>
+        <p:nvSpPr>
+          <p:cNvPr id="84" name="Right Brace 83">
+            <a:extLst>
+              <a:ext uri="{FF2B5EF4-FFF2-40B4-BE49-F238E27FC236}">
+                <a16:creationId xmlns:a16="http://schemas.microsoft.com/office/drawing/2014/main" id="{0D80A934-3BE1-7B69-086F-B46C1B7A40F3}"/>
+              </a:ext>
+            </a:extLst>
+          </p:cNvPr>
+          <p:cNvSpPr/>
+          <p:nvPr/>
+        </p:nvSpPr>
+        <p:spPr>
+          <a:xfrm flipH="1">
+            <a:off x="547563" y="1453452"/>
+            <a:ext cx="253745" cy="4942363"/>
+          </a:xfrm>
+          <a:prstGeom prst="rightBrace">
+            <a:avLst/>
+          </a:prstGeom>
+        </p:spPr>
+        <p:style>
+          <a:lnRef idx="2">
+            <a:schemeClr val="accent1"/>
+          </a:lnRef>
+          <a:fillRef idx="0">
+            <a:schemeClr val="accent1"/>
+          </a:fillRef>
+          <a:effectRef idx="1">
+            <a:schemeClr val="accent1"/>
+          </a:effectRef>
+          <a:fontRef idx="minor">
+            <a:schemeClr val="tx1"/>
+          </a:fontRef>
+        </p:style>
+        <p:txBody>
+          <a:bodyPr rtlCol="0" anchor="ctr"/>
+          <a:lstStyle/>
+          <a:p>
+            <a:pPr algn="ctr"/>
+            <a:endParaRPr lang="en-ZA"/>
+          </a:p>
+        </p:txBody>
+      </p:sp>
+      <p:cxnSp>
+        <p:nvCxnSpPr>
+          <p:cNvPr id="89" name="Connector: Elbow 88">
+            <a:extLst>
+              <a:ext uri="{FF2B5EF4-FFF2-40B4-BE49-F238E27FC236}">
+                <a16:creationId xmlns:a16="http://schemas.microsoft.com/office/drawing/2014/main" id="{1878AD75-D04C-1B63-8C6D-C47AD3E33CC7}"/>
+              </a:ext>
+            </a:extLst>
+          </p:cNvPr>
+          <p:cNvCxnSpPr>
+            <a:cxnSpLocks/>
+            <a:stCxn id="99" idx="2"/>
+          </p:cNvCxnSpPr>
+          <p:nvPr/>
+        </p:nvCxnSpPr>
+        <p:spPr>
+          <a:xfrm rot="16200000" flipH="1">
+            <a:off x="-983646" y="2382425"/>
+            <a:ext cx="3034529" cy="49891"/>
+          </a:xfrm>
+          <a:prstGeom prst="bentConnector3">
+            <a:avLst>
+              <a:gd name="adj1" fmla="val 50000"/>
+            </a:avLst>
+          </a:prstGeom>
+          <a:ln>
+            <a:tailEnd type="triangle"/>
+          </a:ln>
+        </p:spPr>
+        <p:style>
+          <a:lnRef idx="2">
+            <a:schemeClr val="accent1"/>
+          </a:lnRef>
+          <a:fillRef idx="0">
+            <a:schemeClr val="accent1"/>
+          </a:fillRef>
+          <a:effectRef idx="1">
+            <a:schemeClr val="accent1"/>
+          </a:effectRef>
+          <a:fontRef idx="minor">
+            <a:schemeClr val="tx1"/>
+          </a:fontRef>
+        </p:style>
+      </p:cxnSp>
+      <p:sp>
+        <p:nvSpPr>
+          <p:cNvPr id="99" name="Flowchart: Multidocument 98">
+            <a:extLst>
+              <a:ext uri="{FF2B5EF4-FFF2-40B4-BE49-F238E27FC236}">
+                <a16:creationId xmlns:a16="http://schemas.microsoft.com/office/drawing/2014/main" id="{D4935DE2-97C0-4A63-77EA-6AE5BF0AD650}"/>
+              </a:ext>
+            </a:extLst>
+          </p:cNvPr>
+          <p:cNvSpPr/>
+          <p:nvPr/>
+        </p:nvSpPr>
+        <p:spPr>
+          <a:xfrm>
+            <a:off x="101256" y="164726"/>
+            <a:ext cx="946463" cy="753933"/>
+          </a:xfrm>
+          <a:prstGeom prst="flowChartMultidocument">
             <a:avLst/>
           </a:prstGeom>
           <a:solidFill>
-            <a:srgbClr val="000000"/>
+            <a:schemeClr val="accent5">
+              <a:lumMod val="20000"/>
+              <a:lumOff val="80000"/>
+            </a:schemeClr>
           </a:solidFill>
+        </p:spPr>
+        <p:style>
+          <a:lnRef idx="2">
+            <a:schemeClr val="accent1">
+              <a:shade val="15000"/>
+            </a:schemeClr>
+          </a:lnRef>
+          <a:fillRef idx="1">
+            <a:schemeClr val="accent1"/>
+          </a:fillRef>
+          <a:effectRef idx="0">
+            <a:schemeClr val="accent1"/>
+          </a:effectRef>
+          <a:fontRef idx="minor">
+            <a:schemeClr val="lt1"/>
+          </a:fontRef>
+        </p:style>
+        <p:txBody>
+          <a:bodyPr rtlCol="0" anchor="ctr"/>
+          <a:lstStyle/>
+          <a:p>
+            <a:pPr algn="ctr"/>
+            <a:r>
+              <a:rPr lang="en-US" sz="1200" dirty="0">
+                <a:solidFill>
+                  <a:schemeClr val="tx1"/>
+                </a:solidFill>
+              </a:rPr>
+              <a:t>Other Projects</a:t>
+            </a:r>
+            <a:endParaRPr lang="en-ZA" sz="1200" dirty="0">
+              <a:solidFill>
+                <a:schemeClr val="tx1"/>
+              </a:solidFill>
+            </a:endParaRPr>
+          </a:p>
+          <a:p>
+            <a:pPr algn="ctr"/>
+            <a:endParaRPr lang="en-ZA" sz="1200" dirty="0">
+              <a:solidFill>
+                <a:schemeClr val="tx1"/>
+              </a:solidFill>
+            </a:endParaRPr>
+          </a:p>
+        </p:txBody>
+      </p:sp>
+      <p:cxnSp>
+        <p:nvCxnSpPr>
+          <p:cNvPr id="149" name="Straight Arrow Connector 148">
+            <a:extLst>
+              <a:ext uri="{FF2B5EF4-FFF2-40B4-BE49-F238E27FC236}">
+                <a16:creationId xmlns:a16="http://schemas.microsoft.com/office/drawing/2014/main" id="{3C8466C8-1A47-0A73-D65A-44EB43857242}"/>
+              </a:ext>
+            </a:extLst>
+          </p:cNvPr>
+          <p:cNvCxnSpPr>
+            <a:cxnSpLocks/>
+            <a:stCxn id="83" idx="1"/>
+            <a:endCxn id="91" idx="1"/>
+          </p:cNvCxnSpPr>
+          <p:nvPr/>
+        </p:nvCxnSpPr>
+        <p:spPr>
+          <a:xfrm flipV="1">
+            <a:off x="2129221" y="3947972"/>
+            <a:ext cx="470399" cy="104424"/>
+          </a:xfrm>
+          <a:prstGeom prst="straightConnector1">
+            <a:avLst/>
+          </a:prstGeom>
+          <a:ln>
+            <a:tailEnd type="triangle"/>
+          </a:ln>
+        </p:spPr>
+        <p:style>
+          <a:lnRef idx="2">
+            <a:schemeClr val="accent1"/>
+          </a:lnRef>
+          <a:fillRef idx="0">
+            <a:schemeClr val="accent1"/>
+          </a:fillRef>
+          <a:effectRef idx="1">
+            <a:schemeClr val="accent1"/>
+          </a:effectRef>
+          <a:fontRef idx="minor">
+            <a:schemeClr val="tx1"/>
+          </a:fontRef>
+        </p:style>
+      </p:cxnSp>
+      <p:sp>
+        <p:nvSpPr>
+          <p:cNvPr id="177" name="Right Brace 176">
+            <a:extLst>
+              <a:ext uri="{FF2B5EF4-FFF2-40B4-BE49-F238E27FC236}">
+                <a16:creationId xmlns:a16="http://schemas.microsoft.com/office/drawing/2014/main" id="{0908F59F-853B-1953-628B-0AAE71C8D207}"/>
+              </a:ext>
+            </a:extLst>
+          </p:cNvPr>
+          <p:cNvSpPr/>
+          <p:nvPr/>
+        </p:nvSpPr>
+        <p:spPr>
+          <a:xfrm flipH="1">
+            <a:off x="3771346" y="1490170"/>
+            <a:ext cx="98609" cy="4970178"/>
+          </a:xfrm>
+          <a:prstGeom prst="rightBrace">
+            <a:avLst/>
+          </a:prstGeom>
+        </p:spPr>
+        <p:style>
+          <a:lnRef idx="2">
+            <a:schemeClr val="accent1"/>
+          </a:lnRef>
+          <a:fillRef idx="0">
+            <a:schemeClr val="accent1"/>
+          </a:fillRef>
+          <a:effectRef idx="1">
+            <a:schemeClr val="accent1"/>
+          </a:effectRef>
+          <a:fontRef idx="minor">
+            <a:schemeClr val="tx1"/>
+          </a:fontRef>
+        </p:style>
+        <p:txBody>
+          <a:bodyPr rtlCol="0" anchor="ctr"/>
+          <a:lstStyle/>
+          <a:p>
+            <a:pPr algn="ctr"/>
+            <a:endParaRPr lang="en-ZA"/>
+          </a:p>
+        </p:txBody>
+      </p:sp>
+      <p:cxnSp>
+        <p:nvCxnSpPr>
+          <p:cNvPr id="178" name="Straight Arrow Connector 177">
+            <a:extLst>
+              <a:ext uri="{FF2B5EF4-FFF2-40B4-BE49-F238E27FC236}">
+                <a16:creationId xmlns:a16="http://schemas.microsoft.com/office/drawing/2014/main" id="{3549404B-6867-BA5D-1B57-24811C89B570}"/>
+              </a:ext>
+            </a:extLst>
+          </p:cNvPr>
+          <p:cNvCxnSpPr>
+            <a:cxnSpLocks/>
+            <a:stCxn id="91" idx="3"/>
+            <a:endCxn id="177" idx="1"/>
+          </p:cNvCxnSpPr>
+          <p:nvPr/>
+        </p:nvCxnSpPr>
+        <p:spPr>
+          <a:xfrm>
+            <a:off x="3263202" y="3947972"/>
+            <a:ext cx="508144" cy="27287"/>
+          </a:xfrm>
+          <a:prstGeom prst="straightConnector1">
+            <a:avLst/>
+          </a:prstGeom>
+          <a:ln>
+            <a:tailEnd type="triangle"/>
+          </a:ln>
+        </p:spPr>
+        <p:style>
+          <a:lnRef idx="2">
+            <a:schemeClr val="accent1"/>
+          </a:lnRef>
+          <a:fillRef idx="0">
+            <a:schemeClr val="accent1"/>
+          </a:fillRef>
+          <a:effectRef idx="1">
+            <a:schemeClr val="accent1"/>
+          </a:effectRef>
+          <a:fontRef idx="minor">
+            <a:schemeClr val="tx1"/>
+          </a:fontRef>
+        </p:style>
+      </p:cxnSp>
+      <p:cxnSp>
+        <p:nvCxnSpPr>
+          <p:cNvPr id="184" name="Straight Arrow Connector 183">
+            <a:extLst>
+              <a:ext uri="{FF2B5EF4-FFF2-40B4-BE49-F238E27FC236}">
+                <a16:creationId xmlns:a16="http://schemas.microsoft.com/office/drawing/2014/main" id="{B3EF33C2-D423-65D2-0BFC-96FCF7E238C5}"/>
+              </a:ext>
+            </a:extLst>
+          </p:cNvPr>
+          <p:cNvCxnSpPr>
+            <a:cxnSpLocks/>
+            <a:stCxn id="183" idx="2"/>
+            <a:endCxn id="2" idx="1"/>
+          </p:cNvCxnSpPr>
+          <p:nvPr/>
+        </p:nvCxnSpPr>
+        <p:spPr>
+          <a:xfrm flipH="1">
+            <a:off x="4566576" y="3591394"/>
+            <a:ext cx="107158" cy="488486"/>
+          </a:xfrm>
+          <a:prstGeom prst="straightConnector1">
+            <a:avLst/>
+          </a:prstGeom>
+          <a:ln>
+            <a:tailEnd type="triangle"/>
+          </a:ln>
+        </p:spPr>
+        <p:style>
+          <a:lnRef idx="2">
+            <a:schemeClr val="accent1"/>
+          </a:lnRef>
+          <a:fillRef idx="0">
+            <a:schemeClr val="accent1"/>
+          </a:fillRef>
+          <a:effectRef idx="1">
+            <a:schemeClr val="accent1"/>
+          </a:effectRef>
+          <a:fontRef idx="minor">
+            <a:schemeClr val="tx1"/>
+          </a:fontRef>
+        </p:style>
+      </p:cxnSp>
+      <p:cxnSp>
+        <p:nvCxnSpPr>
+          <p:cNvPr id="185" name="Straight Arrow Connector 184">
+            <a:extLst>
+              <a:ext uri="{FF2B5EF4-FFF2-40B4-BE49-F238E27FC236}">
+                <a16:creationId xmlns:a16="http://schemas.microsoft.com/office/drawing/2014/main" id="{19DEEF78-4886-270A-1EA5-8ACD6596BAB5}"/>
+              </a:ext>
+            </a:extLst>
+          </p:cNvPr>
+          <p:cNvCxnSpPr>
+            <a:cxnSpLocks/>
+            <a:stCxn id="11" idx="0"/>
+            <a:endCxn id="23" idx="1"/>
+          </p:cNvCxnSpPr>
+          <p:nvPr/>
+        </p:nvCxnSpPr>
+        <p:spPr>
+          <a:xfrm flipH="1" flipV="1">
+            <a:off x="10135468" y="4288647"/>
+            <a:ext cx="659239" cy="415482"/>
+          </a:xfrm>
+          <a:prstGeom prst="straightConnector1">
+            <a:avLst/>
+          </a:prstGeom>
+          <a:ln>
+            <a:tailEnd type="triangle"/>
+          </a:ln>
+        </p:spPr>
+        <p:style>
+          <a:lnRef idx="2">
+            <a:schemeClr val="accent1"/>
+          </a:lnRef>
+          <a:fillRef idx="0">
+            <a:schemeClr val="accent1"/>
+          </a:fillRef>
+          <a:effectRef idx="1">
+            <a:schemeClr val="accent1"/>
+          </a:effectRef>
+          <a:fontRef idx="minor">
+            <a:schemeClr val="tx1"/>
+          </a:fontRef>
+        </p:style>
+      </p:cxnSp>
+      <p:cxnSp>
+        <p:nvCxnSpPr>
+          <p:cNvPr id="186" name="Straight Arrow Connector 185">
+            <a:extLst>
+              <a:ext uri="{FF2B5EF4-FFF2-40B4-BE49-F238E27FC236}">
+                <a16:creationId xmlns:a16="http://schemas.microsoft.com/office/drawing/2014/main" id="{905CED2F-E13B-CF3B-CA93-38BF1C720440}"/>
+              </a:ext>
+            </a:extLst>
+          </p:cNvPr>
+          <p:cNvCxnSpPr>
+            <a:cxnSpLocks/>
+            <a:stCxn id="2" idx="3"/>
+            <a:endCxn id="75" idx="1"/>
+          </p:cNvCxnSpPr>
+          <p:nvPr/>
+        </p:nvCxnSpPr>
+        <p:spPr>
+          <a:xfrm flipV="1">
+            <a:off x="5764940" y="3530960"/>
+            <a:ext cx="256557" cy="548920"/>
+          </a:xfrm>
+          <a:prstGeom prst="straightConnector1">
+            <a:avLst/>
+          </a:prstGeom>
+          <a:ln>
+            <a:tailEnd type="triangle"/>
+          </a:ln>
+        </p:spPr>
+        <p:style>
+          <a:lnRef idx="2">
+            <a:schemeClr val="accent1"/>
+          </a:lnRef>
+          <a:fillRef idx="0">
+            <a:schemeClr val="accent1"/>
+          </a:fillRef>
+          <a:effectRef idx="1">
+            <a:schemeClr val="accent1"/>
+          </a:effectRef>
+          <a:fontRef idx="minor">
+            <a:schemeClr val="tx1"/>
+          </a:fontRef>
+        </p:style>
+      </p:cxnSp>
+      <p:sp>
+        <p:nvSpPr>
+          <p:cNvPr id="193" name="Flowchart: Decision 192">
+            <a:extLst>
+              <a:ext uri="{FF2B5EF4-FFF2-40B4-BE49-F238E27FC236}">
+                <a16:creationId xmlns:a16="http://schemas.microsoft.com/office/drawing/2014/main" id="{62FCC02E-E9B8-2148-1921-E4763D58CBC4}"/>
+              </a:ext>
+            </a:extLst>
+          </p:cNvPr>
+          <p:cNvSpPr/>
+          <p:nvPr/>
+        </p:nvSpPr>
+        <p:spPr>
+          <a:xfrm>
+            <a:off x="5709598" y="652786"/>
+            <a:ext cx="1188222" cy="811860"/>
+          </a:xfrm>
+          <a:prstGeom prst="flowChartDecision">
+            <a:avLst/>
+          </a:prstGeom>
+          <a:solidFill>
+            <a:srgbClr val="7030A0"/>
+          </a:solidFill>
+        </p:spPr>
+        <p:style>
+          <a:lnRef idx="2">
+            <a:schemeClr val="accent6">
+              <a:shade val="15000"/>
+            </a:schemeClr>
+          </a:lnRef>
+          <a:fillRef idx="1">
+            <a:schemeClr val="accent6"/>
+          </a:fillRef>
+          <a:effectRef idx="0">
+            <a:schemeClr val="accent6"/>
+          </a:effectRef>
+          <a:fontRef idx="minor">
+            <a:schemeClr val="lt1"/>
+          </a:fontRef>
+        </p:style>
+        <p:txBody>
+          <a:bodyPr rtlCol="0" anchor="ctr"/>
+          <a:lstStyle/>
+          <a:p>
+            <a:pPr algn="ctr"/>
+            <a:r>
+              <a:rPr lang="en-US" sz="800" dirty="0" err="1"/>
+              <a:t>Run_zeta_msgdm.Rmd</a:t>
+            </a:r>
+            <a:endParaRPr lang="en-ZA" sz="800" dirty="0"/>
+          </a:p>
+        </p:txBody>
+      </p:sp>
+      <p:sp>
+        <p:nvSpPr>
+          <p:cNvPr id="194" name="TextBox 193">
+            <a:extLst>
+              <a:ext uri="{FF2B5EF4-FFF2-40B4-BE49-F238E27FC236}">
+                <a16:creationId xmlns:a16="http://schemas.microsoft.com/office/drawing/2014/main" id="{911AA6C2-F908-8AF9-B933-AC265BFB92C0}"/>
+              </a:ext>
+            </a:extLst>
+          </p:cNvPr>
+          <p:cNvSpPr txBox="1"/>
+          <p:nvPr/>
+        </p:nvSpPr>
+        <p:spPr>
+          <a:xfrm>
+            <a:off x="5411086" y="1456523"/>
+            <a:ext cx="2180010" cy="369332"/>
+          </a:xfrm>
+          <a:prstGeom prst="rect">
+            <a:avLst/>
+          </a:prstGeom>
+          <a:noFill/>
+        </p:spPr>
+        <p:txBody>
+          <a:bodyPr wrap="square" rtlCol="0">
+            <a:spAutoFit/>
+          </a:bodyPr>
+          <a:lstStyle/>
+          <a:p>
+            <a:r>
+              <a:rPr lang="en-US" sz="900" dirty="0"/>
+              <a:t>This runs  scripts shown in diamonds with purple text and outline</a:t>
+            </a:r>
+            <a:endParaRPr lang="en-ZA" sz="900" dirty="0"/>
+          </a:p>
+        </p:txBody>
+      </p:sp>
+      <p:sp>
+        <p:nvSpPr>
+          <p:cNvPr id="195" name="Flowchart: Multidocument 194">
+            <a:extLst>
+              <a:ext uri="{FF2B5EF4-FFF2-40B4-BE49-F238E27FC236}">
+                <a16:creationId xmlns:a16="http://schemas.microsoft.com/office/drawing/2014/main" id="{31D9BBDF-957E-5A91-0C70-5969E77E6834}"/>
+              </a:ext>
+            </a:extLst>
+          </p:cNvPr>
+          <p:cNvSpPr/>
+          <p:nvPr/>
+        </p:nvSpPr>
+        <p:spPr>
+          <a:xfrm>
+            <a:off x="8900639" y="173365"/>
+            <a:ext cx="946463" cy="1066884"/>
+          </a:xfrm>
+          <a:prstGeom prst="flowChartMultidocument">
+            <a:avLst/>
+          </a:prstGeom>
+          <a:solidFill>
+            <a:schemeClr val="accent1">
+              <a:lumMod val="60000"/>
+              <a:lumOff val="40000"/>
+            </a:schemeClr>
+          </a:solidFill>
+        </p:spPr>
+        <p:style>
+          <a:lnRef idx="2">
+            <a:schemeClr val="accent1">
+              <a:shade val="15000"/>
+            </a:schemeClr>
+          </a:lnRef>
+          <a:fillRef idx="1">
+            <a:schemeClr val="accent1"/>
+          </a:fillRef>
+          <a:effectRef idx="0">
+            <a:schemeClr val="accent1"/>
+          </a:effectRef>
+          <a:fontRef idx="minor">
+            <a:schemeClr val="lt1"/>
+          </a:fontRef>
+        </p:style>
+        <p:txBody>
+          <a:bodyPr rtlCol="0" anchor="ctr"/>
+          <a:lstStyle/>
+          <a:p>
+            <a:pPr algn="ctr"/>
+            <a:r>
+              <a:rPr lang="en-US" sz="1200" dirty="0">
+                <a:solidFill>
+                  <a:schemeClr val="tx1"/>
+                </a:solidFill>
+              </a:rPr>
+              <a:t>Figure and table files</a:t>
+            </a:r>
+            <a:endParaRPr lang="en-ZA" sz="1200" dirty="0">
+              <a:solidFill>
+                <a:schemeClr val="tx1"/>
+              </a:solidFill>
+            </a:endParaRPr>
+          </a:p>
+          <a:p>
+            <a:pPr algn="ctr"/>
+            <a:endParaRPr lang="en-ZA" sz="1200" dirty="0">
+              <a:solidFill>
+                <a:schemeClr val="tx1"/>
+              </a:solidFill>
+            </a:endParaRPr>
+          </a:p>
+        </p:txBody>
+      </p:sp>
+      <p:sp>
+        <p:nvSpPr>
+          <p:cNvPr id="202" name="Flowchart: Decision 201">
+            <a:extLst>
+              <a:ext uri="{FF2B5EF4-FFF2-40B4-BE49-F238E27FC236}">
+                <a16:creationId xmlns:a16="http://schemas.microsoft.com/office/drawing/2014/main" id="{1C9B3EAA-ABA9-B9FF-FDD7-3D53CB06203D}"/>
+              </a:ext>
+            </a:extLst>
+          </p:cNvPr>
+          <p:cNvSpPr/>
+          <p:nvPr/>
+        </p:nvSpPr>
+        <p:spPr>
+          <a:xfrm>
+            <a:off x="11180784" y="3257666"/>
+            <a:ext cx="927306" cy="747151"/>
+          </a:xfrm>
+          <a:prstGeom prst="flowChartDecision">
+            <a:avLst/>
+          </a:prstGeom>
+        </p:spPr>
+        <p:style>
+          <a:lnRef idx="2">
+            <a:schemeClr val="accent6">
+              <a:shade val="15000"/>
+            </a:schemeClr>
+          </a:lnRef>
+          <a:fillRef idx="1">
+            <a:schemeClr val="accent6"/>
+          </a:fillRef>
+          <a:effectRef idx="0">
+            <a:schemeClr val="accent6"/>
+          </a:effectRef>
+          <a:fontRef idx="minor">
+            <a:schemeClr val="lt1"/>
+          </a:fontRef>
+        </p:style>
+        <p:txBody>
+          <a:bodyPr rtlCol="0" anchor="ctr"/>
+          <a:lstStyle/>
+          <a:p>
+            <a:pPr algn="ctr"/>
+            <a:r>
+              <a:rPr lang="en-ZA" sz="500" dirty="0" err="1"/>
+              <a:t>butterfly_msgdm_tables_figures_report.Rmd</a:t>
+            </a:r>
+            <a:endParaRPr lang="en-ZA" sz="500" dirty="0"/>
+          </a:p>
+        </p:txBody>
+      </p:sp>
+      <p:sp>
+        <p:nvSpPr>
+          <p:cNvPr id="206" name="Flowchart: Decision 205">
+            <a:extLst>
+              <a:ext uri="{FF2B5EF4-FFF2-40B4-BE49-F238E27FC236}">
+                <a16:creationId xmlns:a16="http://schemas.microsoft.com/office/drawing/2014/main" id="{86F3F3DC-B855-9CDD-E579-A36272F9FFA0}"/>
+              </a:ext>
+            </a:extLst>
+          </p:cNvPr>
+          <p:cNvSpPr/>
+          <p:nvPr/>
+        </p:nvSpPr>
+        <p:spPr>
+          <a:xfrm>
+            <a:off x="7399453" y="1332141"/>
+            <a:ext cx="1099188" cy="601233"/>
+          </a:xfrm>
+          <a:prstGeom prst="flowChartDecision">
+            <a:avLst/>
+          </a:prstGeom>
+        </p:spPr>
+        <p:style>
+          <a:lnRef idx="2">
+            <a:schemeClr val="accent6">
+              <a:shade val="15000"/>
+            </a:schemeClr>
+          </a:lnRef>
+          <a:fillRef idx="1">
+            <a:schemeClr val="accent6"/>
+          </a:fillRef>
+          <a:effectRef idx="0">
+            <a:schemeClr val="accent6"/>
+          </a:effectRef>
+          <a:fontRef idx="minor">
+            <a:schemeClr val="lt1"/>
+          </a:fontRef>
+        </p:style>
+        <p:txBody>
+          <a:bodyPr rtlCol="0" anchor="ctr"/>
+          <a:lstStyle/>
+          <a:p>
+            <a:pPr algn="ctr"/>
+            <a:r>
+              <a:rPr lang="en-ZA" sz="700" dirty="0" err="1"/>
+              <a:t>Butterfly_maps.Rmd</a:t>
+            </a:r>
+            <a:endParaRPr lang="en-ZA" sz="700" dirty="0"/>
+          </a:p>
+        </p:txBody>
+      </p:sp>
+      <p:cxnSp>
+        <p:nvCxnSpPr>
+          <p:cNvPr id="237" name="Straight Arrow Connector 236">
+            <a:extLst>
+              <a:ext uri="{FF2B5EF4-FFF2-40B4-BE49-F238E27FC236}">
+                <a16:creationId xmlns:a16="http://schemas.microsoft.com/office/drawing/2014/main" id="{DE123E45-1DF5-0235-AFD9-DAEC9A90FF0E}"/>
+              </a:ext>
+            </a:extLst>
+          </p:cNvPr>
+          <p:cNvCxnSpPr>
+            <a:cxnSpLocks/>
+            <a:stCxn id="202" idx="2"/>
+            <a:endCxn id="16" idx="0"/>
+          </p:cNvCxnSpPr>
+          <p:nvPr/>
+        </p:nvCxnSpPr>
+        <p:spPr>
+          <a:xfrm>
+            <a:off x="11644437" y="4004817"/>
+            <a:ext cx="48261" cy="73706"/>
+          </a:xfrm>
+          <a:prstGeom prst="straightConnector1">
+            <a:avLst/>
+          </a:prstGeom>
+          <a:ln>
+            <a:tailEnd type="triangle"/>
+          </a:ln>
+        </p:spPr>
+        <p:style>
+          <a:lnRef idx="2">
+            <a:schemeClr val="accent1"/>
+          </a:lnRef>
+          <a:fillRef idx="0">
+            <a:schemeClr val="accent1"/>
+          </a:fillRef>
+          <a:effectRef idx="1">
+            <a:schemeClr val="accent1"/>
+          </a:effectRef>
+          <a:fontRef idx="minor">
+            <a:schemeClr val="tx1"/>
+          </a:fontRef>
+        </p:style>
+      </p:cxnSp>
+      <p:sp>
+        <p:nvSpPr>
+          <p:cNvPr id="17" name="Flowchart: Decision 16">
+            <a:extLst>
+              <a:ext uri="{FF2B5EF4-FFF2-40B4-BE49-F238E27FC236}">
+                <a16:creationId xmlns:a16="http://schemas.microsoft.com/office/drawing/2014/main" id="{ECA44BFA-BA3E-6A43-959C-AF6314590471}"/>
+              </a:ext>
+            </a:extLst>
+          </p:cNvPr>
+          <p:cNvSpPr/>
+          <p:nvPr/>
+        </p:nvSpPr>
+        <p:spPr>
+          <a:xfrm>
+            <a:off x="10898270" y="1691702"/>
+            <a:ext cx="1019085" cy="585482"/>
+          </a:xfrm>
+          <a:prstGeom prst="flowChartDecision">
+            <a:avLst/>
+          </a:prstGeom>
+        </p:spPr>
+        <p:style>
+          <a:lnRef idx="2">
+            <a:schemeClr val="accent6">
+              <a:shade val="15000"/>
+            </a:schemeClr>
+          </a:lnRef>
+          <a:fillRef idx="1">
+            <a:schemeClr val="accent6"/>
+          </a:fillRef>
+          <a:effectRef idx="0">
+            <a:schemeClr val="accent6"/>
+          </a:effectRef>
+          <a:fontRef idx="minor">
+            <a:schemeClr val="lt1"/>
+          </a:fontRef>
+        </p:style>
+        <p:txBody>
+          <a:bodyPr rtlCol="0" anchor="ctr"/>
+          <a:lstStyle/>
+          <a:p>
+            <a:pPr algn="ctr"/>
+            <a:r>
+              <a:rPr lang="en-US" sz="600" dirty="0"/>
+              <a:t>1 </a:t>
+            </a:r>
+            <a:r>
+              <a:rPr lang="en-US" sz="600" dirty="0" err="1"/>
+              <a:t>maintext</a:t>
+            </a:r>
+            <a:r>
+              <a:rPr lang="en-US" sz="600" dirty="0"/>
+              <a:t> display</a:t>
+            </a:r>
+            <a:endParaRPr lang="en-ZA" sz="600" dirty="0"/>
+          </a:p>
+        </p:txBody>
+      </p:sp>
+      <p:sp>
+        <p:nvSpPr>
+          <p:cNvPr id="22" name="Flowchart: Decision 21">
+            <a:extLst>
+              <a:ext uri="{FF2B5EF4-FFF2-40B4-BE49-F238E27FC236}">
+                <a16:creationId xmlns:a16="http://schemas.microsoft.com/office/drawing/2014/main" id="{A43D6DF6-59D6-11EA-8B30-D1877EAF42ED}"/>
+              </a:ext>
+            </a:extLst>
+          </p:cNvPr>
+          <p:cNvSpPr/>
+          <p:nvPr/>
+        </p:nvSpPr>
+        <p:spPr>
+          <a:xfrm>
+            <a:off x="10407846" y="2416110"/>
+            <a:ext cx="1019085" cy="585482"/>
+          </a:xfrm>
+          <a:prstGeom prst="flowChartDecision">
+            <a:avLst/>
+          </a:prstGeom>
+        </p:spPr>
+        <p:style>
+          <a:lnRef idx="2">
+            <a:schemeClr val="accent6">
+              <a:shade val="15000"/>
+            </a:schemeClr>
+          </a:lnRef>
+          <a:fillRef idx="1">
+            <a:schemeClr val="accent6"/>
+          </a:fillRef>
+          <a:effectRef idx="0">
+            <a:schemeClr val="accent6"/>
+          </a:effectRef>
+          <a:fontRef idx="minor">
+            <a:schemeClr val="lt1"/>
+          </a:fontRef>
+        </p:style>
+        <p:txBody>
+          <a:bodyPr rtlCol="0" anchor="ctr"/>
+          <a:lstStyle/>
+          <a:p>
+            <a:pPr algn="ctr"/>
+            <a:r>
+              <a:rPr lang="en-US" sz="600" dirty="0"/>
+              <a:t>2 data proc occ supp</a:t>
+            </a:r>
+            <a:endParaRPr lang="en-ZA" sz="600" dirty="0"/>
+          </a:p>
+        </p:txBody>
+      </p:sp>
+      <p:sp>
+        <p:nvSpPr>
+          <p:cNvPr id="23" name="Flowchart: Decision 22">
+            <a:extLst>
+              <a:ext uri="{FF2B5EF4-FFF2-40B4-BE49-F238E27FC236}">
+                <a16:creationId xmlns:a16="http://schemas.microsoft.com/office/drawing/2014/main" id="{3C1FE822-BB2C-035D-E698-95E1D50BA6A1}"/>
+              </a:ext>
+            </a:extLst>
+          </p:cNvPr>
+          <p:cNvSpPr/>
+          <p:nvPr/>
+        </p:nvSpPr>
+        <p:spPr>
+          <a:xfrm>
+            <a:off x="10135468" y="3995906"/>
+            <a:ext cx="1019085" cy="585482"/>
+          </a:xfrm>
+          <a:prstGeom prst="flowChartDecision">
+            <a:avLst/>
+          </a:prstGeom>
+        </p:spPr>
+        <p:style>
+          <a:lnRef idx="2">
+            <a:schemeClr val="accent6">
+              <a:shade val="15000"/>
+            </a:schemeClr>
+          </a:lnRef>
+          <a:fillRef idx="1">
+            <a:schemeClr val="accent6"/>
+          </a:fillRef>
+          <a:effectRef idx="0">
+            <a:schemeClr val="accent6"/>
+          </a:effectRef>
+          <a:fontRef idx="minor">
+            <a:schemeClr val="lt1"/>
+          </a:fontRef>
+        </p:style>
+        <p:txBody>
+          <a:bodyPr rtlCol="0" anchor="ctr"/>
+          <a:lstStyle/>
+          <a:p>
+            <a:pPr algn="ctr"/>
+            <a:r>
+              <a:rPr lang="en-US" sz="600" dirty="0"/>
+              <a:t>3 richness supp</a:t>
+            </a:r>
+            <a:endParaRPr lang="en-ZA" sz="600" dirty="0"/>
+          </a:p>
+        </p:txBody>
+      </p:sp>
+      <p:sp>
+        <p:nvSpPr>
+          <p:cNvPr id="24" name="Flowchart: Decision 23">
+            <a:extLst>
+              <a:ext uri="{FF2B5EF4-FFF2-40B4-BE49-F238E27FC236}">
+                <a16:creationId xmlns:a16="http://schemas.microsoft.com/office/drawing/2014/main" id="{CF27A413-A028-4204-4ACA-A6CF5D264854}"/>
+              </a:ext>
+            </a:extLst>
+          </p:cNvPr>
+          <p:cNvSpPr/>
+          <p:nvPr/>
+        </p:nvSpPr>
+        <p:spPr>
+          <a:xfrm>
+            <a:off x="10625352" y="5180015"/>
+            <a:ext cx="1019085" cy="585482"/>
+          </a:xfrm>
+          <a:prstGeom prst="flowChartDecision">
+            <a:avLst/>
+          </a:prstGeom>
+        </p:spPr>
+        <p:style>
+          <a:lnRef idx="2">
+            <a:schemeClr val="accent6">
+              <a:shade val="15000"/>
+            </a:schemeClr>
+          </a:lnRef>
+          <a:fillRef idx="1">
+            <a:schemeClr val="accent6"/>
+          </a:fillRef>
+          <a:effectRef idx="0">
+            <a:schemeClr val="accent6"/>
+          </a:effectRef>
+          <a:fontRef idx="minor">
+            <a:schemeClr val="lt1"/>
+          </a:fontRef>
+        </p:style>
+        <p:txBody>
+          <a:bodyPr rtlCol="0" anchor="ctr"/>
+          <a:lstStyle/>
+          <a:p>
+            <a:pPr algn="ctr"/>
+            <a:r>
+              <a:rPr lang="en-US" sz="600" dirty="0"/>
+              <a:t>4 zeta dec supp</a:t>
+            </a:r>
+            <a:endParaRPr lang="en-ZA" sz="600" dirty="0"/>
+          </a:p>
+        </p:txBody>
+      </p:sp>
+      <p:sp>
+        <p:nvSpPr>
+          <p:cNvPr id="38" name="Flowchart: Decision 37">
+            <a:extLst>
+              <a:ext uri="{FF2B5EF4-FFF2-40B4-BE49-F238E27FC236}">
+                <a16:creationId xmlns:a16="http://schemas.microsoft.com/office/drawing/2014/main" id="{B4BBD7DC-9A75-CD72-6F95-BB70A189230A}"/>
+              </a:ext>
+            </a:extLst>
+          </p:cNvPr>
+          <p:cNvSpPr/>
+          <p:nvPr/>
+        </p:nvSpPr>
+        <p:spPr>
+          <a:xfrm>
+            <a:off x="10982569" y="5940528"/>
+            <a:ext cx="1019085" cy="585482"/>
+          </a:xfrm>
+          <a:prstGeom prst="flowChartDecision">
+            <a:avLst/>
+          </a:prstGeom>
+        </p:spPr>
+        <p:style>
+          <a:lnRef idx="2">
+            <a:schemeClr val="accent6">
+              <a:shade val="15000"/>
+            </a:schemeClr>
+          </a:lnRef>
+          <a:fillRef idx="1">
+            <a:schemeClr val="accent6"/>
+          </a:fillRef>
+          <a:effectRef idx="0">
+            <a:schemeClr val="accent6"/>
+          </a:effectRef>
+          <a:fontRef idx="minor">
+            <a:schemeClr val="lt1"/>
+          </a:fontRef>
+        </p:style>
+        <p:txBody>
+          <a:bodyPr rtlCol="0" anchor="ctr"/>
+          <a:lstStyle/>
+          <a:p>
+            <a:pPr algn="ctr"/>
+            <a:r>
+              <a:rPr lang="en-US" sz="600" dirty="0"/>
+              <a:t>5 </a:t>
+            </a:r>
+            <a:r>
+              <a:rPr lang="en-US" sz="600" dirty="0" err="1"/>
+              <a:t>msgdm</a:t>
+            </a:r>
+            <a:r>
+              <a:rPr lang="en-US" sz="600" dirty="0"/>
+              <a:t> supp</a:t>
+            </a:r>
+            <a:endParaRPr lang="en-ZA" sz="600" dirty="0"/>
+          </a:p>
+        </p:txBody>
+      </p:sp>
+      <p:cxnSp>
+        <p:nvCxnSpPr>
+          <p:cNvPr id="43" name="Straight Arrow Connector 42">
+            <a:extLst>
+              <a:ext uri="{FF2B5EF4-FFF2-40B4-BE49-F238E27FC236}">
+                <a16:creationId xmlns:a16="http://schemas.microsoft.com/office/drawing/2014/main" id="{F47F30FB-1B91-8E60-F6E9-5F2AE119ED66}"/>
+              </a:ext>
+            </a:extLst>
+          </p:cNvPr>
+          <p:cNvCxnSpPr>
+            <a:cxnSpLocks/>
+            <a:stCxn id="17" idx="3"/>
+            <a:endCxn id="202" idx="1"/>
+          </p:cNvCxnSpPr>
+          <p:nvPr/>
+        </p:nvCxnSpPr>
+        <p:spPr>
+          <a:xfrm flipH="1">
+            <a:off x="11180784" y="1984443"/>
+            <a:ext cx="736571" cy="1646799"/>
+          </a:xfrm>
+          <a:prstGeom prst="straightConnector1">
+            <a:avLst/>
+          </a:prstGeom>
+          <a:ln>
+            <a:tailEnd type="triangle"/>
+          </a:ln>
+        </p:spPr>
+        <p:style>
+          <a:lnRef idx="2">
+            <a:schemeClr val="accent1"/>
+          </a:lnRef>
+          <a:fillRef idx="0">
+            <a:schemeClr val="accent1"/>
+          </a:fillRef>
+          <a:effectRef idx="1">
+            <a:schemeClr val="accent1"/>
+          </a:effectRef>
+          <a:fontRef idx="minor">
+            <a:schemeClr val="tx1"/>
+          </a:fontRef>
+        </p:style>
+      </p:cxnSp>
+      <p:cxnSp>
+        <p:nvCxnSpPr>
+          <p:cNvPr id="45" name="Straight Arrow Connector 44">
+            <a:extLst>
+              <a:ext uri="{FF2B5EF4-FFF2-40B4-BE49-F238E27FC236}">
+                <a16:creationId xmlns:a16="http://schemas.microsoft.com/office/drawing/2014/main" id="{2559B6B5-BA6E-3DB5-957A-742FB7757DC3}"/>
+              </a:ext>
+            </a:extLst>
+          </p:cNvPr>
+          <p:cNvCxnSpPr>
+            <a:cxnSpLocks/>
+            <a:stCxn id="23" idx="3"/>
+            <a:endCxn id="202" idx="1"/>
+          </p:cNvCxnSpPr>
+          <p:nvPr/>
+        </p:nvCxnSpPr>
+        <p:spPr>
+          <a:xfrm flipV="1">
+            <a:off x="11154553" y="3631242"/>
+            <a:ext cx="26231" cy="657405"/>
+          </a:xfrm>
+          <a:prstGeom prst="straightConnector1">
+            <a:avLst/>
+          </a:prstGeom>
+          <a:ln>
+            <a:tailEnd type="triangle"/>
+          </a:ln>
+        </p:spPr>
+        <p:style>
+          <a:lnRef idx="2">
+            <a:schemeClr val="accent1"/>
+          </a:lnRef>
+          <a:fillRef idx="0">
+            <a:schemeClr val="accent1"/>
+          </a:fillRef>
+          <a:effectRef idx="1">
+            <a:schemeClr val="accent1"/>
+          </a:effectRef>
+          <a:fontRef idx="minor">
+            <a:schemeClr val="tx1"/>
+          </a:fontRef>
+        </p:style>
+      </p:cxnSp>
+      <p:cxnSp>
+        <p:nvCxnSpPr>
+          <p:cNvPr id="46" name="Straight Arrow Connector 45">
+            <a:extLst>
+              <a:ext uri="{FF2B5EF4-FFF2-40B4-BE49-F238E27FC236}">
+                <a16:creationId xmlns:a16="http://schemas.microsoft.com/office/drawing/2014/main" id="{4964EB87-D675-0C54-FA75-583010EF91D1}"/>
+              </a:ext>
+            </a:extLst>
+          </p:cNvPr>
+          <p:cNvCxnSpPr>
+            <a:cxnSpLocks/>
+            <a:stCxn id="22" idx="2"/>
+            <a:endCxn id="202" idx="1"/>
+          </p:cNvCxnSpPr>
+          <p:nvPr/>
+        </p:nvCxnSpPr>
+        <p:spPr>
+          <a:xfrm>
+            <a:off x="10917389" y="3001592"/>
+            <a:ext cx="263395" cy="629650"/>
+          </a:xfrm>
+          <a:prstGeom prst="straightConnector1">
+            <a:avLst/>
+          </a:prstGeom>
+          <a:ln>
+            <a:tailEnd type="triangle"/>
+          </a:ln>
+        </p:spPr>
+        <p:style>
+          <a:lnRef idx="2">
+            <a:schemeClr val="accent1"/>
+          </a:lnRef>
+          <a:fillRef idx="0">
+            <a:schemeClr val="accent1"/>
+          </a:fillRef>
+          <a:effectRef idx="1">
+            <a:schemeClr val="accent1"/>
+          </a:effectRef>
+          <a:fontRef idx="minor">
+            <a:schemeClr val="tx1"/>
+          </a:fontRef>
+        </p:style>
+      </p:cxnSp>
+      <p:cxnSp>
+        <p:nvCxnSpPr>
+          <p:cNvPr id="47" name="Straight Arrow Connector 46">
+            <a:extLst>
+              <a:ext uri="{FF2B5EF4-FFF2-40B4-BE49-F238E27FC236}">
+                <a16:creationId xmlns:a16="http://schemas.microsoft.com/office/drawing/2014/main" id="{058381AD-B682-1222-9B76-644285E3134C}"/>
+              </a:ext>
+            </a:extLst>
+          </p:cNvPr>
+          <p:cNvCxnSpPr>
+            <a:cxnSpLocks/>
+            <a:stCxn id="24" idx="3"/>
+            <a:endCxn id="202" idx="1"/>
+          </p:cNvCxnSpPr>
+          <p:nvPr/>
+        </p:nvCxnSpPr>
+        <p:spPr>
+          <a:xfrm flipH="1" flipV="1">
+            <a:off x="11180784" y="3631242"/>
+            <a:ext cx="463653" cy="1841514"/>
+          </a:xfrm>
+          <a:prstGeom prst="straightConnector1">
+            <a:avLst/>
+          </a:prstGeom>
+          <a:ln>
+            <a:tailEnd type="triangle"/>
+          </a:ln>
+        </p:spPr>
+        <p:style>
+          <a:lnRef idx="2">
+            <a:schemeClr val="accent1"/>
+          </a:lnRef>
+          <a:fillRef idx="0">
+            <a:schemeClr val="accent1"/>
+          </a:fillRef>
+          <a:effectRef idx="1">
+            <a:schemeClr val="accent1"/>
+          </a:effectRef>
+          <a:fontRef idx="minor">
+            <a:schemeClr val="tx1"/>
+          </a:fontRef>
+        </p:style>
+      </p:cxnSp>
+      <p:cxnSp>
+        <p:nvCxnSpPr>
+          <p:cNvPr id="48" name="Straight Arrow Connector 47">
+            <a:extLst>
+              <a:ext uri="{FF2B5EF4-FFF2-40B4-BE49-F238E27FC236}">
+                <a16:creationId xmlns:a16="http://schemas.microsoft.com/office/drawing/2014/main" id="{90084AF2-7B38-E6DC-3C02-C07043380A61}"/>
+              </a:ext>
+            </a:extLst>
+          </p:cNvPr>
+          <p:cNvCxnSpPr>
+            <a:cxnSpLocks/>
+            <a:stCxn id="38" idx="3"/>
+            <a:endCxn id="202" idx="1"/>
+          </p:cNvCxnSpPr>
+          <p:nvPr/>
+        </p:nvCxnSpPr>
+        <p:spPr>
+          <a:xfrm flipH="1" flipV="1">
+            <a:off x="11180784" y="3631242"/>
+            <a:ext cx="820870" cy="2602027"/>
+          </a:xfrm>
+          <a:prstGeom prst="straightConnector1">
+            <a:avLst/>
+          </a:prstGeom>
+          <a:ln>
+            <a:tailEnd type="triangle"/>
+          </a:ln>
+        </p:spPr>
+        <p:style>
+          <a:lnRef idx="2">
+            <a:schemeClr val="accent1"/>
+          </a:lnRef>
+          <a:fillRef idx="0">
+            <a:schemeClr val="accent1"/>
+          </a:fillRef>
+          <a:effectRef idx="1">
+            <a:schemeClr val="accent1"/>
+          </a:effectRef>
+          <a:fontRef idx="minor">
+            <a:schemeClr val="tx1"/>
+          </a:fontRef>
+        </p:style>
+      </p:cxnSp>
+      <p:sp>
+        <p:nvSpPr>
+          <p:cNvPr id="81" name="Flowchart: Document 80">
+            <a:extLst>
+              <a:ext uri="{FF2B5EF4-FFF2-40B4-BE49-F238E27FC236}">
+                <a16:creationId xmlns:a16="http://schemas.microsoft.com/office/drawing/2014/main" id="{C8205EAA-A50D-EE98-A0AA-D4EF49011DD5}"/>
+              </a:ext>
+            </a:extLst>
+          </p:cNvPr>
+          <p:cNvSpPr/>
+          <p:nvPr/>
+        </p:nvSpPr>
+        <p:spPr>
+          <a:xfrm>
+            <a:off x="8849592" y="1490170"/>
+            <a:ext cx="928789" cy="385278"/>
+          </a:xfrm>
+          <a:prstGeom prst="flowChartDocument">
+            <a:avLst/>
+          </a:prstGeom>
         </p:spPr>
         <p:style>
           <a:lnRef idx="2">
@@ -4915,22 +6509,115 @@
           <a:p>
             <a:pPr algn="ctr"/>
             <a:r>
-              <a:rPr lang="en-ZA" sz="900" dirty="0"/>
-              <a:t>Results Markdown Report</a:t>
+              <a:rPr lang="en-US" sz="500" dirty="0" err="1"/>
+              <a:t>Gamm_multipanel_figFig</a:t>
+            </a:r>
+            <a:r>
+              <a:rPr lang="en-US" sz="500" dirty="0"/>
+              <a:t>. 1 Hex_dens_transects_richness.png</a:t>
             </a:r>
           </a:p>
           <a:p>
             <a:pPr algn="ctr"/>
-            <a:endParaRPr lang="en-ZA" sz="900" dirty="0"/>
-          </a:p>
-        </p:txBody>
-      </p:sp>
-      <p:sp>
-        <p:nvSpPr>
-          <p:cNvPr id="25" name="Flowchart: Process 24">
-            <a:extLst>
-              <a:ext uri="{FF2B5EF4-FFF2-40B4-BE49-F238E27FC236}">
-                <a16:creationId xmlns:a16="http://schemas.microsoft.com/office/drawing/2014/main" id="{D00F3089-D084-30FC-5896-D00F781FDFD3}"/>
+            <a:r>
+              <a:rPr lang="en-ZA" sz="500" dirty="0"/>
+              <a:t>Fig: 2 all_env_vars.png</a:t>
+            </a:r>
+          </a:p>
+        </p:txBody>
+      </p:sp>
+      <p:cxnSp>
+        <p:nvCxnSpPr>
+          <p:cNvPr id="154" name="Straight Arrow Connector 153">
+            <a:extLst>
+              <a:ext uri="{FF2B5EF4-FFF2-40B4-BE49-F238E27FC236}">
+                <a16:creationId xmlns:a16="http://schemas.microsoft.com/office/drawing/2014/main" id="{1ACB76FB-C66D-1837-5213-4E390263AFEE}"/>
+              </a:ext>
+            </a:extLst>
+          </p:cNvPr>
+          <p:cNvCxnSpPr>
+            <a:cxnSpLocks/>
+            <a:stCxn id="206" idx="3"/>
+            <a:endCxn id="81" idx="1"/>
+          </p:cNvCxnSpPr>
+          <p:nvPr/>
+        </p:nvCxnSpPr>
+        <p:spPr>
+          <a:xfrm>
+            <a:off x="8498641" y="1632758"/>
+            <a:ext cx="350951" cy="50051"/>
+          </a:xfrm>
+          <a:prstGeom prst="straightConnector1">
+            <a:avLst/>
+          </a:prstGeom>
+          <a:ln>
+            <a:tailEnd type="triangle"/>
+          </a:ln>
+        </p:spPr>
+        <p:style>
+          <a:lnRef idx="2">
+            <a:schemeClr val="accent1"/>
+          </a:lnRef>
+          <a:fillRef idx="0">
+            <a:schemeClr val="accent1"/>
+          </a:fillRef>
+          <a:effectRef idx="1">
+            <a:schemeClr val="accent1"/>
+          </a:effectRef>
+          <a:fontRef idx="minor">
+            <a:schemeClr val="tx1"/>
+          </a:fontRef>
+        </p:style>
+      </p:cxnSp>
+      <p:cxnSp>
+        <p:nvCxnSpPr>
+          <p:cNvPr id="157" name="Straight Arrow Connector 156">
+            <a:extLst>
+              <a:ext uri="{FF2B5EF4-FFF2-40B4-BE49-F238E27FC236}">
+                <a16:creationId xmlns:a16="http://schemas.microsoft.com/office/drawing/2014/main" id="{7DA80BF1-5CC9-E4BA-6747-BBF3ED611F10}"/>
+              </a:ext>
+            </a:extLst>
+          </p:cNvPr>
+          <p:cNvCxnSpPr>
+            <a:cxnSpLocks/>
+            <a:stCxn id="81" idx="3"/>
+            <a:endCxn id="17" idx="1"/>
+          </p:cNvCxnSpPr>
+          <p:nvPr/>
+        </p:nvCxnSpPr>
+        <p:spPr>
+          <a:xfrm>
+            <a:off x="9778381" y="1682809"/>
+            <a:ext cx="1119889" cy="301634"/>
+          </a:xfrm>
+          <a:prstGeom prst="straightConnector1">
+            <a:avLst/>
+          </a:prstGeom>
+          <a:ln>
+            <a:tailEnd type="triangle"/>
+          </a:ln>
+        </p:spPr>
+        <p:style>
+          <a:lnRef idx="2">
+            <a:schemeClr val="accent1"/>
+          </a:lnRef>
+          <a:fillRef idx="0">
+            <a:schemeClr val="accent1"/>
+          </a:fillRef>
+          <a:effectRef idx="1">
+            <a:schemeClr val="accent1"/>
+          </a:effectRef>
+          <a:fontRef idx="minor">
+            <a:schemeClr val="tx1"/>
+          </a:fontRef>
+        </p:style>
+      </p:cxnSp>
+      <p:sp>
+        <p:nvSpPr>
+          <p:cNvPr id="163" name="Flowchart: Decision 162">
+            <a:extLst>
+              <a:ext uri="{FF2B5EF4-FFF2-40B4-BE49-F238E27FC236}">
+                <a16:creationId xmlns:a16="http://schemas.microsoft.com/office/drawing/2014/main" id="{0C1C90BF-A448-45EF-7D27-8F0D8D3A6759}"/>
               </a:ext>
             </a:extLst>
           </p:cNvPr>
@@ -4939,10 +6626,60 @@
         </p:nvSpPr>
         <p:spPr>
           <a:xfrm>
-            <a:off x="6586815" y="4159810"/>
-            <a:ext cx="812638" cy="364271"/>
-          </a:xfrm>
-          <a:prstGeom prst="flowChartProcess">
+            <a:off x="7399453" y="2027529"/>
+            <a:ext cx="1099188" cy="601233"/>
+          </a:xfrm>
+          <a:prstGeom prst="flowChartDecision">
+            <a:avLst/>
+          </a:prstGeom>
+        </p:spPr>
+        <p:style>
+          <a:lnRef idx="2">
+            <a:schemeClr val="accent6">
+              <a:shade val="15000"/>
+            </a:schemeClr>
+          </a:lnRef>
+          <a:fillRef idx="1">
+            <a:schemeClr val="accent6"/>
+          </a:fillRef>
+          <a:effectRef idx="0">
+            <a:schemeClr val="accent6"/>
+          </a:effectRef>
+          <a:fontRef idx="minor">
+            <a:schemeClr val="lt1"/>
+          </a:fontRef>
+        </p:style>
+        <p:txBody>
+          <a:bodyPr rtlCol="0" anchor="ctr"/>
+          <a:lstStyle/>
+          <a:p>
+            <a:pPr algn="ctr"/>
+            <a:r>
+              <a:rPr lang="en-ZA" sz="700" dirty="0" err="1"/>
+              <a:t>Gamm_multipanel_fig.Rmd</a:t>
+            </a:r>
+            <a:endParaRPr lang="en-ZA" sz="700" dirty="0"/>
+          </a:p>
+        </p:txBody>
+      </p:sp>
+      <p:sp>
+        <p:nvSpPr>
+          <p:cNvPr id="164" name="Flowchart: Document 163">
+            <a:extLst>
+              <a:ext uri="{FF2B5EF4-FFF2-40B4-BE49-F238E27FC236}">
+                <a16:creationId xmlns:a16="http://schemas.microsoft.com/office/drawing/2014/main" id="{BB58F0F7-9298-2A66-FB2D-9E967F9C23BE}"/>
+              </a:ext>
+            </a:extLst>
+          </p:cNvPr>
+          <p:cNvSpPr/>
+          <p:nvPr/>
+        </p:nvSpPr>
+        <p:spPr>
+          <a:xfrm>
+            <a:off x="8849591" y="1990784"/>
+            <a:ext cx="928789" cy="385278"/>
+          </a:xfrm>
+          <a:prstGeom prst="flowChartDocument">
             <a:avLst/>
           </a:prstGeom>
         </p:spPr>
@@ -4968,36 +6705,33 @@
           <a:p>
             <a:pPr algn="ctr"/>
             <a:r>
-              <a:rPr lang="en-ZA" sz="700" dirty="0"/>
-              <a:t>GAMM output</a:t>
-            </a:r>
-          </a:p>
-          <a:p>
-            <a:pPr algn="ctr"/>
-            <a:endParaRPr lang="en-ZA" sz="700" dirty="0"/>
+              <a:rPr lang="en-US" sz="500" dirty="0"/>
+              <a:t>Fig. 3 gam_multiplot.png</a:t>
+            </a:r>
+            <a:endParaRPr lang="en-ZA" sz="500" dirty="0"/>
           </a:p>
         </p:txBody>
       </p:sp>
       <p:cxnSp>
         <p:nvCxnSpPr>
-          <p:cNvPr id="36" name="Straight Arrow Connector 35">
-            <a:extLst>
-              <a:ext uri="{FF2B5EF4-FFF2-40B4-BE49-F238E27FC236}">
-                <a16:creationId xmlns:a16="http://schemas.microsoft.com/office/drawing/2014/main" id="{400374F4-B1E8-F0F4-07FD-0353BC6BCFA5}"/>
+          <p:cNvPr id="165" name="Straight Arrow Connector 164">
+            <a:extLst>
+              <a:ext uri="{FF2B5EF4-FFF2-40B4-BE49-F238E27FC236}">
+                <a16:creationId xmlns:a16="http://schemas.microsoft.com/office/drawing/2014/main" id="{E72C594A-A558-2B7A-8F2B-5B3A1786B768}"/>
               </a:ext>
             </a:extLst>
           </p:cNvPr>
           <p:cNvCxnSpPr>
             <a:cxnSpLocks/>
-            <a:stCxn id="75" idx="3"/>
-            <a:endCxn id="25" idx="0"/>
+            <a:stCxn id="163" idx="3"/>
+            <a:endCxn id="164" idx="1"/>
           </p:cNvCxnSpPr>
           <p:nvPr/>
         </p:nvCxnSpPr>
         <p:spPr>
-          <a:xfrm flipH="1">
-            <a:off x="6993134" y="3530960"/>
-            <a:ext cx="226727" cy="628850"/>
+          <a:xfrm flipV="1">
+            <a:off x="8498641" y="2183423"/>
+            <a:ext cx="350950" cy="144723"/>
           </a:xfrm>
           <a:prstGeom prst="straightConnector1">
             <a:avLst/>
@@ -5023,24 +6757,24 @@
       </p:cxnSp>
       <p:cxnSp>
         <p:nvCxnSpPr>
-          <p:cNvPr id="37" name="Straight Arrow Connector 36">
-            <a:extLst>
-              <a:ext uri="{FF2B5EF4-FFF2-40B4-BE49-F238E27FC236}">
-                <a16:creationId xmlns:a16="http://schemas.microsoft.com/office/drawing/2014/main" id="{035214D3-8CBA-77F0-9A80-2F74313564A8}"/>
+          <p:cNvPr id="174" name="Straight Arrow Connector 173">
+            <a:extLst>
+              <a:ext uri="{FF2B5EF4-FFF2-40B4-BE49-F238E27FC236}">
+                <a16:creationId xmlns:a16="http://schemas.microsoft.com/office/drawing/2014/main" id="{4916695C-C3C1-D583-F5FE-131631F95A38}"/>
               </a:ext>
             </a:extLst>
           </p:cNvPr>
           <p:cNvCxnSpPr>
             <a:cxnSpLocks/>
-            <a:stCxn id="25" idx="3"/>
-            <a:endCxn id="9" idx="2"/>
+            <a:stCxn id="164" idx="3"/>
+            <a:endCxn id="17" idx="1"/>
           </p:cNvCxnSpPr>
           <p:nvPr/>
         </p:nvCxnSpPr>
         <p:spPr>
-          <a:xfrm>
-            <a:off x="7399453" y="4341946"/>
-            <a:ext cx="468619" cy="101155"/>
+          <a:xfrm flipV="1">
+            <a:off x="9778380" y="1984443"/>
+            <a:ext cx="1119890" cy="198980"/>
           </a:xfrm>
           <a:prstGeom prst="straightConnector1">
             <a:avLst/>
@@ -5064,12 +6798,132 @@
           </a:fontRef>
         </p:style>
       </p:cxnSp>
-      <p:sp>
-        <p:nvSpPr>
-          <p:cNvPr id="39" name="Flowchart: Process 38">
-            <a:extLst>
-              <a:ext uri="{FF2B5EF4-FFF2-40B4-BE49-F238E27FC236}">
-                <a16:creationId xmlns:a16="http://schemas.microsoft.com/office/drawing/2014/main" id="{6348209E-B6A1-9676-A1B8-D72A245A09B9}"/>
+      <p:grpSp>
+        <p:nvGrpSpPr>
+          <p:cNvPr id="18" name="Group 17">
+            <a:extLst>
+              <a:ext uri="{FF2B5EF4-FFF2-40B4-BE49-F238E27FC236}">
+                <a16:creationId xmlns:a16="http://schemas.microsoft.com/office/drawing/2014/main" id="{65156E20-5172-EA2E-B720-B43ACC9DAF21}"/>
+              </a:ext>
+            </a:extLst>
+          </p:cNvPr>
+          <p:cNvGrpSpPr/>
+          <p:nvPr/>
+        </p:nvGrpSpPr>
+        <p:grpSpPr>
+          <a:xfrm>
+            <a:off x="4074552" y="2861385"/>
+            <a:ext cx="1717444" cy="730009"/>
+            <a:chOff x="4079329" y="2889182"/>
+            <a:chExt cx="1717444" cy="730009"/>
+          </a:xfrm>
+        </p:grpSpPr>
+        <p:sp>
+          <p:nvSpPr>
+            <p:cNvPr id="183" name="Flowchart: Decision 182">
+              <a:extLst>
+                <a:ext uri="{FF2B5EF4-FFF2-40B4-BE49-F238E27FC236}">
+                  <a16:creationId xmlns:a16="http://schemas.microsoft.com/office/drawing/2014/main" id="{8A59B1EE-CA44-C203-885D-D564641ABF66}"/>
+                </a:ext>
+              </a:extLst>
+            </p:cNvPr>
+            <p:cNvSpPr/>
+            <p:nvPr/>
+          </p:nvSpPr>
+          <p:spPr>
+            <a:xfrm>
+              <a:off x="4079329" y="2941128"/>
+              <a:ext cx="1198364" cy="678063"/>
+            </a:xfrm>
+            <a:prstGeom prst="flowChartDecision">
+              <a:avLst/>
+            </a:prstGeom>
+            <a:ln>
+              <a:solidFill>
+                <a:srgbClr val="7030A0"/>
+              </a:solidFill>
+            </a:ln>
+          </p:spPr>
+          <p:style>
+            <a:lnRef idx="2">
+              <a:schemeClr val="accent6">
+                <a:shade val="15000"/>
+              </a:schemeClr>
+            </a:lnRef>
+            <a:fillRef idx="1">
+              <a:schemeClr val="accent6"/>
+            </a:fillRef>
+            <a:effectRef idx="0">
+              <a:schemeClr val="accent6"/>
+            </a:effectRef>
+            <a:fontRef idx="minor">
+              <a:schemeClr val="lt1"/>
+            </a:fontRef>
+          </p:style>
+          <p:txBody>
+            <a:bodyPr rtlCol="0" anchor="ctr"/>
+            <a:lstStyle/>
+            <a:p>
+              <a:pPr algn="ctr"/>
+              <a:r>
+                <a:rPr lang="en-US" sz="600" dirty="0" err="1">
+                  <a:solidFill>
+                    <a:srgbClr val="7030A0"/>
+                  </a:solidFill>
+                </a:rPr>
+                <a:t>GAM_compare_spline_analyses.Rmd</a:t>
+              </a:r>
+              <a:endParaRPr lang="en-ZA" sz="600" dirty="0">
+                <a:solidFill>
+                  <a:srgbClr val="7030A0"/>
+                </a:solidFill>
+              </a:endParaRPr>
+            </a:p>
+          </p:txBody>
+        </p:sp>
+        <p:sp>
+          <p:nvSpPr>
+            <p:cNvPr id="15" name="TextBox 14">
+              <a:extLst>
+                <a:ext uri="{FF2B5EF4-FFF2-40B4-BE49-F238E27FC236}">
+                  <a16:creationId xmlns:a16="http://schemas.microsoft.com/office/drawing/2014/main" id="{F38F42A9-E841-6950-909A-64F140F41053}"/>
+                </a:ext>
+              </a:extLst>
+            </p:cNvPr>
+            <p:cNvSpPr txBox="1"/>
+            <p:nvPr/>
+          </p:nvSpPr>
+          <p:spPr>
+            <a:xfrm>
+              <a:off x="5109091" y="2889182"/>
+              <a:ext cx="687682" cy="400110"/>
+            </a:xfrm>
+            <a:prstGeom prst="rect">
+              <a:avLst/>
+            </a:prstGeom>
+            <a:noFill/>
+          </p:spPr>
+          <p:txBody>
+            <a:bodyPr wrap="square" rtlCol="0">
+              <a:spAutoFit/>
+            </a:bodyPr>
+            <a:lstStyle/>
+            <a:p>
+              <a:r>
+                <a:rPr lang="en-US" sz="500" dirty="0"/>
+                <a:t>Cited as preliminary, not reported otherwise</a:t>
+              </a:r>
+              <a:endParaRPr lang="en-ZA" sz="500" dirty="0"/>
+            </a:p>
+          </p:txBody>
+        </p:sp>
+      </p:grpSp>
+      <p:sp>
+        <p:nvSpPr>
+          <p:cNvPr id="51" name="Flowchart: Decision 50">
+            <a:extLst>
+              <a:ext uri="{FF2B5EF4-FFF2-40B4-BE49-F238E27FC236}">
+                <a16:creationId xmlns:a16="http://schemas.microsoft.com/office/drawing/2014/main" id="{97AFA0E3-9BA8-D3D7-4152-A23BC3D4ABFD}"/>
               </a:ext>
             </a:extLst>
           </p:cNvPr>
@@ -5078,8 +6932,114 @@
         </p:nvSpPr>
         <p:spPr>
           <a:xfrm>
-            <a:off x="6232948" y="5191318"/>
-            <a:ext cx="812638" cy="364271"/>
+            <a:off x="7992799" y="3174595"/>
+            <a:ext cx="1198364" cy="678063"/>
+          </a:xfrm>
+          <a:prstGeom prst="flowChartDecision">
+            <a:avLst/>
+          </a:prstGeom>
+          <a:ln>
+            <a:solidFill>
+              <a:srgbClr val="7030A0"/>
+            </a:solidFill>
+          </a:ln>
+        </p:spPr>
+        <p:style>
+          <a:lnRef idx="2">
+            <a:schemeClr val="accent6">
+              <a:shade val="15000"/>
+            </a:schemeClr>
+          </a:lnRef>
+          <a:fillRef idx="1">
+            <a:schemeClr val="accent6"/>
+          </a:fillRef>
+          <a:effectRef idx="0">
+            <a:schemeClr val="accent6"/>
+          </a:effectRef>
+          <a:fontRef idx="minor">
+            <a:schemeClr val="lt1"/>
+          </a:fontRef>
+        </p:style>
+        <p:txBody>
+          <a:bodyPr rtlCol="0" anchor="ctr"/>
+          <a:lstStyle/>
+          <a:p>
+            <a:pPr algn="ctr"/>
+            <a:r>
+              <a:rPr lang="en-US" sz="600" dirty="0" err="1">
+                <a:solidFill>
+                  <a:srgbClr val="7030A0"/>
+                </a:solidFill>
+              </a:rPr>
+              <a:t>GAMM_model_selection.Rmd</a:t>
+            </a:r>
+            <a:endParaRPr lang="en-ZA" sz="600" dirty="0">
+              <a:solidFill>
+                <a:srgbClr val="7030A0"/>
+              </a:solidFill>
+            </a:endParaRPr>
+          </a:p>
+        </p:txBody>
+      </p:sp>
+      <p:cxnSp>
+        <p:nvCxnSpPr>
+          <p:cNvPr id="58" name="Straight Arrow Connector 57">
+            <a:extLst>
+              <a:ext uri="{FF2B5EF4-FFF2-40B4-BE49-F238E27FC236}">
+                <a16:creationId xmlns:a16="http://schemas.microsoft.com/office/drawing/2014/main" id="{5820EA64-DEE3-6211-55AD-2C97054133AB}"/>
+              </a:ext>
+            </a:extLst>
+          </p:cNvPr>
+          <p:cNvCxnSpPr>
+            <a:cxnSpLocks/>
+            <a:stCxn id="25" idx="3"/>
+            <a:endCxn id="51" idx="1"/>
+          </p:cNvCxnSpPr>
+          <p:nvPr/>
+        </p:nvCxnSpPr>
+        <p:spPr>
+          <a:xfrm flipV="1">
+            <a:off x="7202478" y="3513627"/>
+            <a:ext cx="790321" cy="958270"/>
+          </a:xfrm>
+          <a:prstGeom prst="straightConnector1">
+            <a:avLst/>
+          </a:prstGeom>
+          <a:ln>
+            <a:tailEnd type="triangle"/>
+          </a:ln>
+        </p:spPr>
+        <p:style>
+          <a:lnRef idx="2">
+            <a:schemeClr val="accent1"/>
+          </a:lnRef>
+          <a:fillRef idx="0">
+            <a:schemeClr val="accent1"/>
+          </a:fillRef>
+          <a:effectRef idx="1">
+            <a:schemeClr val="accent1"/>
+          </a:effectRef>
+          <a:fontRef idx="minor">
+            <a:schemeClr val="tx1"/>
+          </a:fontRef>
+        </p:style>
+      </p:cxnSp>
+      <p:sp>
+        <p:nvSpPr>
+          <p:cNvPr id="67" name="Flowchart: Process 66">
+            <a:extLst>
+              <a:ext uri="{FF2B5EF4-FFF2-40B4-BE49-F238E27FC236}">
+                <a16:creationId xmlns:a16="http://schemas.microsoft.com/office/drawing/2014/main" id="{8D8994AA-179A-A277-7D29-E2A310D5B541}"/>
+              </a:ext>
+            </a:extLst>
+          </p:cNvPr>
+          <p:cNvSpPr/>
+          <p:nvPr/>
+        </p:nvSpPr>
+        <p:spPr>
+          <a:xfrm>
+            <a:off x="9277972" y="3600802"/>
+            <a:ext cx="882106" cy="374457"/>
           </a:xfrm>
           <a:prstGeom prst="flowChartProcess">
             <a:avLst/>
@@ -5107,40 +7067,45 @@
           <a:p>
             <a:pPr algn="ctr"/>
             <a:r>
-              <a:rPr lang="en-ZA" sz="700" dirty="0" err="1"/>
-              <a:t>Msgdm</a:t>
-            </a:r>
-            <a:r>
-              <a:rPr lang="en-ZA" sz="700" dirty="0"/>
-              <a:t> output</a:t>
-            </a:r>
-          </a:p>
-          <a:p>
-            <a:pPr algn="ctr"/>
-            <a:endParaRPr lang="en-ZA" sz="700" dirty="0"/>
+              <a:rPr lang="en-US" sz="600" dirty="0"/>
+              <a:t>…</a:t>
+            </a:r>
+            <a:r>
+              <a:rPr lang="en-US" sz="600" dirty="0" err="1"/>
+              <a:t>gamm_model_select</a:t>
+            </a:r>
+            <a:r>
+              <a:rPr lang="en-US" sz="600" dirty="0"/>
+              <a:t>_.....</a:t>
+            </a:r>
+            <a:r>
+              <a:rPr lang="en-US" sz="600" dirty="0" err="1"/>
+              <a:t>rds</a:t>
+            </a:r>
+            <a:endParaRPr lang="en-ZA" sz="600" dirty="0"/>
           </a:p>
         </p:txBody>
       </p:sp>
       <p:cxnSp>
         <p:nvCxnSpPr>
-          <p:cNvPr id="40" name="Straight Arrow Connector 39">
-            <a:extLst>
-              <a:ext uri="{FF2B5EF4-FFF2-40B4-BE49-F238E27FC236}">
-                <a16:creationId xmlns:a16="http://schemas.microsoft.com/office/drawing/2014/main" id="{CE1B6F74-2681-827A-F7CD-3E26946A52EF}"/>
+          <p:cNvPr id="68" name="Straight Arrow Connector 67">
+            <a:extLst>
+              <a:ext uri="{FF2B5EF4-FFF2-40B4-BE49-F238E27FC236}">
+                <a16:creationId xmlns:a16="http://schemas.microsoft.com/office/drawing/2014/main" id="{A07ABBD4-2C6C-2F00-C3C2-EF9BBF69F6A4}"/>
               </a:ext>
             </a:extLst>
           </p:cNvPr>
           <p:cNvCxnSpPr>
             <a:cxnSpLocks/>
-            <a:stCxn id="6" idx="3"/>
-            <a:endCxn id="39" idx="1"/>
+            <a:stCxn id="51" idx="3"/>
+            <a:endCxn id="67" idx="0"/>
           </p:cNvCxnSpPr>
           <p:nvPr/>
         </p:nvCxnSpPr>
         <p:spPr>
           <a:xfrm>
-            <a:off x="5881305" y="5327744"/>
-            <a:ext cx="351643" cy="45710"/>
+            <a:off x="9191163" y="3513627"/>
+            <a:ext cx="527862" cy="87175"/>
           </a:xfrm>
           <a:prstGeom prst="straightConnector1">
             <a:avLst/>
@@ -5166,24 +7131,24 @@
       </p:cxnSp>
       <p:cxnSp>
         <p:nvCxnSpPr>
-          <p:cNvPr id="41" name="Straight Arrow Connector 40">
-            <a:extLst>
-              <a:ext uri="{FF2B5EF4-FFF2-40B4-BE49-F238E27FC236}">
-                <a16:creationId xmlns:a16="http://schemas.microsoft.com/office/drawing/2014/main" id="{725E58FE-2A86-9221-80CB-B73A3F2D8E82}"/>
+          <p:cNvPr id="70" name="Straight Arrow Connector 69">
+            <a:extLst>
+              <a:ext uri="{FF2B5EF4-FFF2-40B4-BE49-F238E27FC236}">
+                <a16:creationId xmlns:a16="http://schemas.microsoft.com/office/drawing/2014/main" id="{AE6A2CDC-4B81-6363-85FD-14FA4A6B51E4}"/>
               </a:ext>
             </a:extLst>
           </p:cNvPr>
           <p:cNvCxnSpPr>
             <a:cxnSpLocks/>
-            <a:stCxn id="39" idx="3"/>
-            <a:endCxn id="3" idx="0"/>
+            <a:stCxn id="67" idx="2"/>
+            <a:endCxn id="62" idx="0"/>
           </p:cNvCxnSpPr>
           <p:nvPr/>
         </p:nvCxnSpPr>
         <p:spPr>
-          <a:xfrm flipV="1">
-            <a:off x="7045586" y="5097647"/>
-            <a:ext cx="882106" cy="275807"/>
+          <a:xfrm flipH="1">
+            <a:off x="9182936" y="3975259"/>
+            <a:ext cx="536089" cy="319713"/>
           </a:xfrm>
           <a:prstGeom prst="straightConnector1">
             <a:avLst/>
@@ -5209,10 +7174,10 @@
       </p:cxnSp>
       <p:sp>
         <p:nvSpPr>
-          <p:cNvPr id="75" name="Flowchart: Decision 74">
-            <a:extLst>
-              <a:ext uri="{FF2B5EF4-FFF2-40B4-BE49-F238E27FC236}">
-                <a16:creationId xmlns:a16="http://schemas.microsoft.com/office/drawing/2014/main" id="{7C93B17A-EF2D-AB60-2BDF-DD00A8440548}"/>
+          <p:cNvPr id="77" name="Flowchart: Decision 76">
+            <a:extLst>
+              <a:ext uri="{FF2B5EF4-FFF2-40B4-BE49-F238E27FC236}">
+                <a16:creationId xmlns:a16="http://schemas.microsoft.com/office/drawing/2014/main" id="{2A3F2CDE-27C4-A274-0B30-91FA934DEF47}"/>
               </a:ext>
             </a:extLst>
           </p:cNvPr>
@@ -5221,12 +7186,17 @@
         </p:nvSpPr>
         <p:spPr>
           <a:xfrm>
-            <a:off x="6021497" y="3191928"/>
+            <a:off x="8789332" y="5018181"/>
             <a:ext cx="1198364" cy="678063"/>
           </a:xfrm>
           <a:prstGeom prst="flowChartDecision">
             <a:avLst/>
           </a:prstGeom>
+          <a:ln>
+            <a:solidFill>
+              <a:srgbClr val="7030A0"/>
+            </a:solidFill>
+          </a:ln>
         </p:spPr>
         <p:style>
           <a:lnRef idx="2">
@@ -5250,125 +7220,44 @@
           <a:p>
             <a:pPr algn="ctr"/>
             <a:r>
-              <a:rPr lang="en-US" sz="600" dirty="0" err="1"/>
-              <a:t>GAMM_analyses.Rmd</a:t>
-            </a:r>
-            <a:endParaRPr lang="en-ZA" sz="600" dirty="0"/>
-          </a:p>
-        </p:txBody>
-      </p:sp>
-      <p:sp>
-        <p:nvSpPr>
-          <p:cNvPr id="83" name="Right Brace 82">
-            <a:extLst>
-              <a:ext uri="{FF2B5EF4-FFF2-40B4-BE49-F238E27FC236}">
-                <a16:creationId xmlns:a16="http://schemas.microsoft.com/office/drawing/2014/main" id="{2B5C80FE-1B9A-1684-18D4-4E8E4617C5B2}"/>
-              </a:ext>
-            </a:extLst>
-          </p:cNvPr>
-          <p:cNvSpPr/>
-          <p:nvPr/>
-        </p:nvSpPr>
-        <p:spPr>
-          <a:xfrm>
-            <a:off x="1932054" y="1555832"/>
-            <a:ext cx="197167" cy="4993128"/>
-          </a:xfrm>
-          <a:prstGeom prst="rightBrace">
-            <a:avLst/>
-          </a:prstGeom>
-        </p:spPr>
-        <p:style>
-          <a:lnRef idx="2">
-            <a:schemeClr val="accent1"/>
-          </a:lnRef>
-          <a:fillRef idx="0">
-            <a:schemeClr val="accent1"/>
-          </a:fillRef>
-          <a:effectRef idx="1">
-            <a:schemeClr val="accent1"/>
-          </a:effectRef>
-          <a:fontRef idx="minor">
-            <a:schemeClr val="tx1"/>
-          </a:fontRef>
-        </p:style>
-        <p:txBody>
-          <a:bodyPr rtlCol="0" anchor="ctr"/>
-          <a:lstStyle/>
-          <a:p>
-            <a:pPr algn="ctr"/>
-            <a:endParaRPr lang="en-ZA"/>
-          </a:p>
-        </p:txBody>
-      </p:sp>
-      <p:sp>
-        <p:nvSpPr>
-          <p:cNvPr id="84" name="Right Brace 83">
-            <a:extLst>
-              <a:ext uri="{FF2B5EF4-FFF2-40B4-BE49-F238E27FC236}">
-                <a16:creationId xmlns:a16="http://schemas.microsoft.com/office/drawing/2014/main" id="{0D80A934-3BE1-7B69-086F-B46C1B7A40F3}"/>
-              </a:ext>
-            </a:extLst>
-          </p:cNvPr>
-          <p:cNvSpPr/>
-          <p:nvPr/>
-        </p:nvSpPr>
-        <p:spPr>
-          <a:xfrm flipH="1">
-            <a:off x="547563" y="1453452"/>
-            <a:ext cx="253745" cy="4942363"/>
-          </a:xfrm>
-          <a:prstGeom prst="rightBrace">
-            <a:avLst/>
-          </a:prstGeom>
-        </p:spPr>
-        <p:style>
-          <a:lnRef idx="2">
-            <a:schemeClr val="accent1"/>
-          </a:lnRef>
-          <a:fillRef idx="0">
-            <a:schemeClr val="accent1"/>
-          </a:fillRef>
-          <a:effectRef idx="1">
-            <a:schemeClr val="accent1"/>
-          </a:effectRef>
-          <a:fontRef idx="minor">
-            <a:schemeClr val="tx1"/>
-          </a:fontRef>
-        </p:style>
-        <p:txBody>
-          <a:bodyPr rtlCol="0" anchor="ctr"/>
-          <a:lstStyle/>
-          <a:p>
-            <a:pPr algn="ctr"/>
-            <a:endParaRPr lang="en-ZA"/>
+              <a:rPr lang="en-US" sz="600" dirty="0" err="1">
+                <a:solidFill>
+                  <a:srgbClr val="7030A0"/>
+                </a:solidFill>
+              </a:rPr>
+              <a:t>Gamm_multipanel_figs.Rmd</a:t>
+            </a:r>
+            <a:endParaRPr lang="en-ZA" sz="600" dirty="0">
+              <a:solidFill>
+                <a:srgbClr val="7030A0"/>
+              </a:solidFill>
+            </a:endParaRPr>
           </a:p>
         </p:txBody>
       </p:sp>
       <p:cxnSp>
         <p:nvCxnSpPr>
-          <p:cNvPr id="89" name="Connector: Elbow 88">
-            <a:extLst>
-              <a:ext uri="{FF2B5EF4-FFF2-40B4-BE49-F238E27FC236}">
-                <a16:creationId xmlns:a16="http://schemas.microsoft.com/office/drawing/2014/main" id="{1878AD75-D04C-1B63-8C6D-C47AD3E33CC7}"/>
+          <p:cNvPr id="78" name="Straight Arrow Connector 77">
+            <a:extLst>
+              <a:ext uri="{FF2B5EF4-FFF2-40B4-BE49-F238E27FC236}">
+                <a16:creationId xmlns:a16="http://schemas.microsoft.com/office/drawing/2014/main" id="{99A1241E-FCAB-71BD-FE15-8635A4AEF885}"/>
               </a:ext>
             </a:extLst>
           </p:cNvPr>
           <p:cNvCxnSpPr>
             <a:cxnSpLocks/>
-            <a:stCxn id="99" idx="2"/>
+            <a:stCxn id="67" idx="2"/>
+            <a:endCxn id="77" idx="0"/>
           </p:cNvCxnSpPr>
           <p:nvPr/>
         </p:nvCxnSpPr>
         <p:spPr>
-          <a:xfrm rot="16200000" flipH="1">
-            <a:off x="-983646" y="2382425"/>
-            <a:ext cx="3034529" cy="49891"/>
-          </a:xfrm>
-          <a:prstGeom prst="bentConnector3">
-            <a:avLst>
-              <a:gd name="adj1" fmla="val 50000"/>
-            </a:avLst>
+          <a:xfrm flipH="1">
+            <a:off x="9388514" y="3975259"/>
+            <a:ext cx="330511" cy="1042922"/>
+          </a:xfrm>
+          <a:prstGeom prst="straightConnector1">
+            <a:avLst/>
           </a:prstGeom>
           <a:ln>
             <a:tailEnd type="triangle"/>
@@ -5391,10 +7280,10 @@
       </p:cxnSp>
       <p:sp>
         <p:nvSpPr>
-          <p:cNvPr id="99" name="Flowchart: Multidocument 98">
-            <a:extLst>
-              <a:ext uri="{FF2B5EF4-FFF2-40B4-BE49-F238E27FC236}">
-                <a16:creationId xmlns:a16="http://schemas.microsoft.com/office/drawing/2014/main" id="{D4935DE2-97C0-4A63-77EA-6AE5BF0AD650}"/>
+          <p:cNvPr id="62" name="Flowchart: Decision 61">
+            <a:extLst>
+              <a:ext uri="{FF2B5EF4-FFF2-40B4-BE49-F238E27FC236}">
+                <a16:creationId xmlns:a16="http://schemas.microsoft.com/office/drawing/2014/main" id="{647E868E-C5C1-28BB-C153-B92114470305}"/>
               </a:ext>
             </a:extLst>
           </p:cNvPr>
@@ -5403,209 +7292,7 @@
         </p:nvSpPr>
         <p:spPr>
           <a:xfrm>
-            <a:off x="101256" y="164726"/>
-            <a:ext cx="946463" cy="753933"/>
-          </a:xfrm>
-          <a:prstGeom prst="flowChartMultidocument">
-            <a:avLst/>
-          </a:prstGeom>
-          <a:solidFill>
-            <a:schemeClr val="accent5">
-              <a:lumMod val="20000"/>
-              <a:lumOff val="80000"/>
-            </a:schemeClr>
-          </a:solidFill>
-        </p:spPr>
-        <p:style>
-          <a:lnRef idx="2">
-            <a:schemeClr val="accent1">
-              <a:shade val="15000"/>
-            </a:schemeClr>
-          </a:lnRef>
-          <a:fillRef idx="1">
-            <a:schemeClr val="accent1"/>
-          </a:fillRef>
-          <a:effectRef idx="0">
-            <a:schemeClr val="accent1"/>
-          </a:effectRef>
-          <a:fontRef idx="minor">
-            <a:schemeClr val="lt1"/>
-          </a:fontRef>
-        </p:style>
-        <p:txBody>
-          <a:bodyPr rtlCol="0" anchor="ctr"/>
-          <a:lstStyle/>
-          <a:p>
-            <a:pPr algn="ctr"/>
-            <a:r>
-              <a:rPr lang="en-US" sz="1200" dirty="0">
-                <a:solidFill>
-                  <a:schemeClr val="tx1"/>
-                </a:solidFill>
-              </a:rPr>
-              <a:t>Other Projects</a:t>
-            </a:r>
-            <a:endParaRPr lang="en-ZA" sz="1200" dirty="0">
-              <a:solidFill>
-                <a:schemeClr val="tx1"/>
-              </a:solidFill>
-            </a:endParaRPr>
-          </a:p>
-          <a:p>
-            <a:pPr algn="ctr"/>
-            <a:endParaRPr lang="en-ZA" sz="1200" dirty="0">
-              <a:solidFill>
-                <a:schemeClr val="tx1"/>
-              </a:solidFill>
-            </a:endParaRPr>
-          </a:p>
-        </p:txBody>
-      </p:sp>
-      <p:cxnSp>
-        <p:nvCxnSpPr>
-          <p:cNvPr id="149" name="Straight Arrow Connector 148">
-            <a:extLst>
-              <a:ext uri="{FF2B5EF4-FFF2-40B4-BE49-F238E27FC236}">
-                <a16:creationId xmlns:a16="http://schemas.microsoft.com/office/drawing/2014/main" id="{3C8466C8-1A47-0A73-D65A-44EB43857242}"/>
-              </a:ext>
-            </a:extLst>
-          </p:cNvPr>
-          <p:cNvCxnSpPr>
-            <a:cxnSpLocks/>
-            <a:stCxn id="83" idx="1"/>
-            <a:endCxn id="91" idx="1"/>
-          </p:cNvCxnSpPr>
-          <p:nvPr/>
-        </p:nvCxnSpPr>
-        <p:spPr>
-          <a:xfrm flipV="1">
-            <a:off x="2129221" y="3947972"/>
-            <a:ext cx="470399" cy="104424"/>
-          </a:xfrm>
-          <a:prstGeom prst="straightConnector1">
-            <a:avLst/>
-          </a:prstGeom>
-          <a:ln>
-            <a:tailEnd type="triangle"/>
-          </a:ln>
-        </p:spPr>
-        <p:style>
-          <a:lnRef idx="2">
-            <a:schemeClr val="accent1"/>
-          </a:lnRef>
-          <a:fillRef idx="0">
-            <a:schemeClr val="accent1"/>
-          </a:fillRef>
-          <a:effectRef idx="1">
-            <a:schemeClr val="accent1"/>
-          </a:effectRef>
-          <a:fontRef idx="minor">
-            <a:schemeClr val="tx1"/>
-          </a:fontRef>
-        </p:style>
-      </p:cxnSp>
-      <p:sp>
-        <p:nvSpPr>
-          <p:cNvPr id="177" name="Right Brace 176">
-            <a:extLst>
-              <a:ext uri="{FF2B5EF4-FFF2-40B4-BE49-F238E27FC236}">
-                <a16:creationId xmlns:a16="http://schemas.microsoft.com/office/drawing/2014/main" id="{0908F59F-853B-1953-628B-0AAE71C8D207}"/>
-              </a:ext>
-            </a:extLst>
-          </p:cNvPr>
-          <p:cNvSpPr/>
-          <p:nvPr/>
-        </p:nvSpPr>
-        <p:spPr>
-          <a:xfrm flipH="1">
-            <a:off x="3771346" y="1490170"/>
-            <a:ext cx="98609" cy="4970178"/>
-          </a:xfrm>
-          <a:prstGeom prst="rightBrace">
-            <a:avLst/>
-          </a:prstGeom>
-        </p:spPr>
-        <p:style>
-          <a:lnRef idx="2">
-            <a:schemeClr val="accent1"/>
-          </a:lnRef>
-          <a:fillRef idx="0">
-            <a:schemeClr val="accent1"/>
-          </a:fillRef>
-          <a:effectRef idx="1">
-            <a:schemeClr val="accent1"/>
-          </a:effectRef>
-          <a:fontRef idx="minor">
-            <a:schemeClr val="tx1"/>
-          </a:fontRef>
-        </p:style>
-        <p:txBody>
-          <a:bodyPr rtlCol="0" anchor="ctr"/>
-          <a:lstStyle/>
-          <a:p>
-            <a:pPr algn="ctr"/>
-            <a:endParaRPr lang="en-ZA"/>
-          </a:p>
-        </p:txBody>
-      </p:sp>
-      <p:cxnSp>
-        <p:nvCxnSpPr>
-          <p:cNvPr id="178" name="Straight Arrow Connector 177">
-            <a:extLst>
-              <a:ext uri="{FF2B5EF4-FFF2-40B4-BE49-F238E27FC236}">
-                <a16:creationId xmlns:a16="http://schemas.microsoft.com/office/drawing/2014/main" id="{3549404B-6867-BA5D-1B57-24811C89B570}"/>
-              </a:ext>
-            </a:extLst>
-          </p:cNvPr>
-          <p:cNvCxnSpPr>
-            <a:cxnSpLocks/>
-            <a:stCxn id="91" idx="3"/>
-            <a:endCxn id="177" idx="1"/>
-          </p:cNvCxnSpPr>
-          <p:nvPr/>
-        </p:nvCxnSpPr>
-        <p:spPr>
-          <a:xfrm>
-            <a:off x="3263202" y="3947972"/>
-            <a:ext cx="508144" cy="27287"/>
-          </a:xfrm>
-          <a:prstGeom prst="straightConnector1">
-            <a:avLst/>
-          </a:prstGeom>
-          <a:ln>
-            <a:tailEnd type="triangle"/>
-          </a:ln>
-        </p:spPr>
-        <p:style>
-          <a:lnRef idx="2">
-            <a:schemeClr val="accent1"/>
-          </a:lnRef>
-          <a:fillRef idx="0">
-            <a:schemeClr val="accent1"/>
-          </a:fillRef>
-          <a:effectRef idx="1">
-            <a:schemeClr val="accent1"/>
-          </a:effectRef>
-          <a:fontRef idx="minor">
-            <a:schemeClr val="tx1"/>
-          </a:fontRef>
-        </p:style>
-      </p:cxnSp>
-      <p:sp>
-        <p:nvSpPr>
-          <p:cNvPr id="183" name="Flowchart: Decision 182">
-            <a:extLst>
-              <a:ext uri="{FF2B5EF4-FFF2-40B4-BE49-F238E27FC236}">
-                <a16:creationId xmlns:a16="http://schemas.microsoft.com/office/drawing/2014/main" id="{8A59B1EE-CA44-C203-885D-D564641ABF66}"/>
-              </a:ext>
-            </a:extLst>
-          </p:cNvPr>
-          <p:cNvSpPr/>
-          <p:nvPr/>
-        </p:nvSpPr>
-        <p:spPr>
-          <a:xfrm>
-            <a:off x="5246807" y="3816652"/>
+            <a:off x="8583754" y="4294972"/>
             <a:ext cx="1198364" cy="678063"/>
           </a:xfrm>
           <a:prstGeom prst="flowChartDecision">
@@ -5644,7 +7331,7 @@
                   <a:srgbClr val="7030A0"/>
                 </a:solidFill>
               </a:rPr>
-              <a:t>GAM_compare_spline_analyses.Rmd</a:t>
+              <a:t>process_GAMMS_single_result_output.Rmd</a:t>
             </a:r>
             <a:endParaRPr lang="en-ZA" sz="600" dirty="0">
               <a:solidFill>
@@ -5654,141 +7341,12 @@
           </a:p>
         </p:txBody>
       </p:sp>
-      <p:cxnSp>
-        <p:nvCxnSpPr>
-          <p:cNvPr id="184" name="Straight Arrow Connector 183">
-            <a:extLst>
-              <a:ext uri="{FF2B5EF4-FFF2-40B4-BE49-F238E27FC236}">
-                <a16:creationId xmlns:a16="http://schemas.microsoft.com/office/drawing/2014/main" id="{B3EF33C2-D423-65D2-0BFC-96FCF7E238C5}"/>
-              </a:ext>
-            </a:extLst>
-          </p:cNvPr>
-          <p:cNvCxnSpPr>
-            <a:cxnSpLocks/>
-            <a:stCxn id="2" idx="3"/>
-            <a:endCxn id="183" idx="1"/>
-          </p:cNvCxnSpPr>
-          <p:nvPr/>
-        </p:nvCxnSpPr>
-        <p:spPr>
-          <a:xfrm flipH="1">
-            <a:off x="5246807" y="3490244"/>
-            <a:ext cx="597305" cy="665440"/>
-          </a:xfrm>
-          <a:prstGeom prst="straightConnector1">
-            <a:avLst/>
-          </a:prstGeom>
-          <a:ln>
-            <a:tailEnd type="triangle"/>
-          </a:ln>
-        </p:spPr>
-        <p:style>
-          <a:lnRef idx="2">
-            <a:schemeClr val="accent1"/>
-          </a:lnRef>
-          <a:fillRef idx="0">
-            <a:schemeClr val="accent1"/>
-          </a:fillRef>
-          <a:effectRef idx="1">
-            <a:schemeClr val="accent1"/>
-          </a:effectRef>
-          <a:fontRef idx="minor">
-            <a:schemeClr val="tx1"/>
-          </a:fontRef>
-        </p:style>
-      </p:cxnSp>
-      <p:cxnSp>
-        <p:nvCxnSpPr>
-          <p:cNvPr id="185" name="Straight Arrow Connector 184">
-            <a:extLst>
-              <a:ext uri="{FF2B5EF4-FFF2-40B4-BE49-F238E27FC236}">
-                <a16:creationId xmlns:a16="http://schemas.microsoft.com/office/drawing/2014/main" id="{19DEEF78-4886-270A-1EA5-8ACD6596BAB5}"/>
-              </a:ext>
-            </a:extLst>
-          </p:cNvPr>
-          <p:cNvCxnSpPr>
-            <a:cxnSpLocks/>
-            <a:stCxn id="11" idx="0"/>
-            <a:endCxn id="23" idx="1"/>
-          </p:cNvCxnSpPr>
-          <p:nvPr/>
-        </p:nvCxnSpPr>
-        <p:spPr>
-          <a:xfrm flipH="1" flipV="1">
-            <a:off x="10135468" y="4288647"/>
-            <a:ext cx="659239" cy="415482"/>
-          </a:xfrm>
-          <a:prstGeom prst="straightConnector1">
-            <a:avLst/>
-          </a:prstGeom>
-          <a:ln>
-            <a:tailEnd type="triangle"/>
-          </a:ln>
-        </p:spPr>
-        <p:style>
-          <a:lnRef idx="2">
-            <a:schemeClr val="accent1"/>
-          </a:lnRef>
-          <a:fillRef idx="0">
-            <a:schemeClr val="accent1"/>
-          </a:fillRef>
-          <a:effectRef idx="1">
-            <a:schemeClr val="accent1"/>
-          </a:effectRef>
-          <a:fontRef idx="minor">
-            <a:schemeClr val="tx1"/>
-          </a:fontRef>
-        </p:style>
-      </p:cxnSp>
-      <p:cxnSp>
-        <p:nvCxnSpPr>
-          <p:cNvPr id="186" name="Straight Arrow Connector 185">
-            <a:extLst>
-              <a:ext uri="{FF2B5EF4-FFF2-40B4-BE49-F238E27FC236}">
-                <a16:creationId xmlns:a16="http://schemas.microsoft.com/office/drawing/2014/main" id="{905CED2F-E13B-CF3B-CA93-38BF1C720440}"/>
-              </a:ext>
-            </a:extLst>
-          </p:cNvPr>
-          <p:cNvCxnSpPr>
-            <a:cxnSpLocks/>
-            <a:stCxn id="183" idx="3"/>
-            <a:endCxn id="75" idx="1"/>
-          </p:cNvCxnSpPr>
-          <p:nvPr/>
-        </p:nvCxnSpPr>
-        <p:spPr>
-          <a:xfrm flipH="1" flipV="1">
-            <a:off x="6021497" y="3530960"/>
-            <a:ext cx="423674" cy="624724"/>
-          </a:xfrm>
-          <a:prstGeom prst="straightConnector1">
-            <a:avLst/>
-          </a:prstGeom>
-          <a:ln>
-            <a:tailEnd type="triangle"/>
-          </a:ln>
-        </p:spPr>
-        <p:style>
-          <a:lnRef idx="2">
-            <a:schemeClr val="accent1"/>
-          </a:lnRef>
-          <a:fillRef idx="0">
-            <a:schemeClr val="accent1"/>
-          </a:fillRef>
-          <a:effectRef idx="1">
-            <a:schemeClr val="accent1"/>
-          </a:effectRef>
-          <a:fontRef idx="minor">
-            <a:schemeClr val="tx1"/>
-          </a:fontRef>
-        </p:style>
-      </p:cxnSp>
-      <p:sp>
-        <p:nvSpPr>
-          <p:cNvPr id="193" name="Flowchart: Decision 192">
-            <a:extLst>
-              <a:ext uri="{FF2B5EF4-FFF2-40B4-BE49-F238E27FC236}">
-                <a16:creationId xmlns:a16="http://schemas.microsoft.com/office/drawing/2014/main" id="{62FCC02E-E9B8-2148-1921-E4763D58CBC4}"/>
+      <p:sp>
+        <p:nvSpPr>
+          <p:cNvPr id="9" name="Flowchart: Decision 8">
+            <a:extLst>
+              <a:ext uri="{FF2B5EF4-FFF2-40B4-BE49-F238E27FC236}">
+                <a16:creationId xmlns:a16="http://schemas.microsoft.com/office/drawing/2014/main" id="{1AA0AEFF-E0B5-9C25-05D1-26EBD06E17B4}"/>
               </a:ext>
             </a:extLst>
           </p:cNvPr>
@@ -5797,15 +7355,17 @@
         </p:nvSpPr>
         <p:spPr>
           <a:xfrm>
-            <a:off x="5709598" y="652786"/>
-            <a:ext cx="1188222" cy="811860"/>
+            <a:off x="7475681" y="3674481"/>
+            <a:ext cx="1198364" cy="678063"/>
           </a:xfrm>
           <a:prstGeom prst="flowChartDecision">
             <a:avLst/>
           </a:prstGeom>
-          <a:solidFill>
-            <a:srgbClr val="7030A0"/>
-          </a:solidFill>
+          <a:ln>
+            <a:solidFill>
+              <a:srgbClr val="7030A0"/>
+            </a:solidFill>
+          </a:ln>
         </p:spPr>
         <p:style>
           <a:lnRef idx="2">
@@ -5829,1077 +7389,21 @@
           <a:p>
             <a:pPr algn="ctr"/>
             <a:r>
-              <a:rPr lang="en-US" sz="800" dirty="0" err="1"/>
-              <a:t>Run_zeta_msgdm.Rmd</a:t>
-            </a:r>
-            <a:endParaRPr lang="en-ZA" sz="800" dirty="0"/>
-          </a:p>
-        </p:txBody>
-      </p:sp>
-      <p:sp>
-        <p:nvSpPr>
-          <p:cNvPr id="194" name="TextBox 193">
-            <a:extLst>
-              <a:ext uri="{FF2B5EF4-FFF2-40B4-BE49-F238E27FC236}">
-                <a16:creationId xmlns:a16="http://schemas.microsoft.com/office/drawing/2014/main" id="{911AA6C2-F908-8AF9-B933-AC265BFB92C0}"/>
-              </a:ext>
-            </a:extLst>
-          </p:cNvPr>
-          <p:cNvSpPr txBox="1"/>
-          <p:nvPr/>
-        </p:nvSpPr>
-        <p:spPr>
-          <a:xfrm>
-            <a:off x="5411086" y="1456523"/>
-            <a:ext cx="2180010" cy="369332"/>
-          </a:xfrm>
-          <a:prstGeom prst="rect">
-            <a:avLst/>
-          </a:prstGeom>
-          <a:noFill/>
-        </p:spPr>
-        <p:txBody>
-          <a:bodyPr wrap="square" rtlCol="0">
-            <a:spAutoFit/>
-          </a:bodyPr>
-          <a:lstStyle/>
-          <a:p>
-            <a:r>
-              <a:rPr lang="en-US" sz="900" dirty="0"/>
-              <a:t>This runs  scripts shown in diamonds with purple text and outline</a:t>
-            </a:r>
-            <a:endParaRPr lang="en-ZA" sz="900" dirty="0"/>
-          </a:p>
-        </p:txBody>
-      </p:sp>
-      <p:sp>
-        <p:nvSpPr>
-          <p:cNvPr id="195" name="Flowchart: Multidocument 194">
-            <a:extLst>
-              <a:ext uri="{FF2B5EF4-FFF2-40B4-BE49-F238E27FC236}">
-                <a16:creationId xmlns:a16="http://schemas.microsoft.com/office/drawing/2014/main" id="{31D9BBDF-957E-5A91-0C70-5969E77E6834}"/>
-              </a:ext>
-            </a:extLst>
-          </p:cNvPr>
-          <p:cNvSpPr/>
-          <p:nvPr/>
-        </p:nvSpPr>
-        <p:spPr>
-          <a:xfrm>
-            <a:off x="8900639" y="173365"/>
-            <a:ext cx="946463" cy="1066884"/>
-          </a:xfrm>
-          <a:prstGeom prst="flowChartMultidocument">
-            <a:avLst/>
-          </a:prstGeom>
-          <a:solidFill>
-            <a:schemeClr val="accent1">
-              <a:lumMod val="60000"/>
-              <a:lumOff val="40000"/>
-            </a:schemeClr>
-          </a:solidFill>
-        </p:spPr>
-        <p:style>
-          <a:lnRef idx="2">
-            <a:schemeClr val="accent1">
-              <a:shade val="15000"/>
-            </a:schemeClr>
-          </a:lnRef>
-          <a:fillRef idx="1">
-            <a:schemeClr val="accent1"/>
-          </a:fillRef>
-          <a:effectRef idx="0">
-            <a:schemeClr val="accent1"/>
-          </a:effectRef>
-          <a:fontRef idx="minor">
-            <a:schemeClr val="lt1"/>
-          </a:fontRef>
-        </p:style>
-        <p:txBody>
-          <a:bodyPr rtlCol="0" anchor="ctr"/>
-          <a:lstStyle/>
-          <a:p>
-            <a:pPr algn="ctr"/>
-            <a:r>
-              <a:rPr lang="en-US" sz="1200" dirty="0">
+              <a:rPr lang="en-US" sz="600" dirty="0" err="1">
                 <a:solidFill>
-                  <a:schemeClr val="tx1"/>
+                  <a:srgbClr val="7030A0"/>
                 </a:solidFill>
               </a:rPr>
-              <a:t>Figure and table files</a:t>
-            </a:r>
-            <a:endParaRPr lang="en-ZA" sz="1200" dirty="0">
+              <a:t>Process_GAMM_analyses.Rmd</a:t>
+            </a:r>
+            <a:endParaRPr lang="en-ZA" sz="600" dirty="0">
               <a:solidFill>
-                <a:schemeClr val="tx1"/>
+                <a:srgbClr val="7030A0"/>
               </a:solidFill>
             </a:endParaRPr>
           </a:p>
-          <a:p>
-            <a:pPr algn="ctr"/>
-            <a:endParaRPr lang="en-ZA" sz="1200" dirty="0">
-              <a:solidFill>
-                <a:schemeClr val="tx1"/>
-              </a:solidFill>
-            </a:endParaRPr>
-          </a:p>
-        </p:txBody>
-      </p:sp>
-      <p:sp>
-        <p:nvSpPr>
-          <p:cNvPr id="202" name="Flowchart: Decision 201">
-            <a:extLst>
-              <a:ext uri="{FF2B5EF4-FFF2-40B4-BE49-F238E27FC236}">
-                <a16:creationId xmlns:a16="http://schemas.microsoft.com/office/drawing/2014/main" id="{1C9B3EAA-ABA9-B9FF-FDD7-3D53CB06203D}"/>
-              </a:ext>
-            </a:extLst>
-          </p:cNvPr>
-          <p:cNvSpPr/>
-          <p:nvPr/>
-        </p:nvSpPr>
-        <p:spPr>
-          <a:xfrm>
-            <a:off x="11180784" y="3257666"/>
-            <a:ext cx="927306" cy="747151"/>
-          </a:xfrm>
-          <a:prstGeom prst="flowChartDecision">
-            <a:avLst/>
-          </a:prstGeom>
-        </p:spPr>
-        <p:style>
-          <a:lnRef idx="2">
-            <a:schemeClr val="accent6">
-              <a:shade val="15000"/>
-            </a:schemeClr>
-          </a:lnRef>
-          <a:fillRef idx="1">
-            <a:schemeClr val="accent6"/>
-          </a:fillRef>
-          <a:effectRef idx="0">
-            <a:schemeClr val="accent6"/>
-          </a:effectRef>
-          <a:fontRef idx="minor">
-            <a:schemeClr val="lt1"/>
-          </a:fontRef>
-        </p:style>
-        <p:txBody>
-          <a:bodyPr rtlCol="0" anchor="ctr"/>
-          <a:lstStyle/>
-          <a:p>
-            <a:pPr algn="ctr"/>
-            <a:r>
-              <a:rPr lang="en-ZA" sz="500" dirty="0" err="1"/>
-              <a:t>butterfly_msgdm_tables_figures_report.Rmd</a:t>
-            </a:r>
-            <a:endParaRPr lang="en-ZA" sz="500" dirty="0"/>
-          </a:p>
-        </p:txBody>
-      </p:sp>
-      <p:sp>
-        <p:nvSpPr>
-          <p:cNvPr id="206" name="Flowchart: Decision 205">
-            <a:extLst>
-              <a:ext uri="{FF2B5EF4-FFF2-40B4-BE49-F238E27FC236}">
-                <a16:creationId xmlns:a16="http://schemas.microsoft.com/office/drawing/2014/main" id="{86F3F3DC-B855-9CDD-E579-A36272F9FFA0}"/>
-              </a:ext>
-            </a:extLst>
-          </p:cNvPr>
-          <p:cNvSpPr/>
-          <p:nvPr/>
-        </p:nvSpPr>
-        <p:spPr>
-          <a:xfrm>
-            <a:off x="7399453" y="1332141"/>
-            <a:ext cx="1099188" cy="601233"/>
-          </a:xfrm>
-          <a:prstGeom prst="flowChartDecision">
-            <a:avLst/>
-          </a:prstGeom>
-        </p:spPr>
-        <p:style>
-          <a:lnRef idx="2">
-            <a:schemeClr val="accent6">
-              <a:shade val="15000"/>
-            </a:schemeClr>
-          </a:lnRef>
-          <a:fillRef idx="1">
-            <a:schemeClr val="accent6"/>
-          </a:fillRef>
-          <a:effectRef idx="0">
-            <a:schemeClr val="accent6"/>
-          </a:effectRef>
-          <a:fontRef idx="minor">
-            <a:schemeClr val="lt1"/>
-          </a:fontRef>
-        </p:style>
-        <p:txBody>
-          <a:bodyPr rtlCol="0" anchor="ctr"/>
-          <a:lstStyle/>
-          <a:p>
-            <a:pPr algn="ctr"/>
-            <a:r>
-              <a:rPr lang="en-ZA" sz="700" dirty="0" err="1"/>
-              <a:t>Butterfly_maps.Rmd</a:t>
-            </a:r>
-            <a:endParaRPr lang="en-ZA" sz="700" dirty="0"/>
-          </a:p>
-        </p:txBody>
-      </p:sp>
-      <p:cxnSp>
-        <p:nvCxnSpPr>
-          <p:cNvPr id="237" name="Straight Arrow Connector 236">
-            <a:extLst>
-              <a:ext uri="{FF2B5EF4-FFF2-40B4-BE49-F238E27FC236}">
-                <a16:creationId xmlns:a16="http://schemas.microsoft.com/office/drawing/2014/main" id="{DE123E45-1DF5-0235-AFD9-DAEC9A90FF0E}"/>
-              </a:ext>
-            </a:extLst>
-          </p:cNvPr>
-          <p:cNvCxnSpPr>
-            <a:cxnSpLocks/>
-            <a:stCxn id="202" idx="2"/>
-            <a:endCxn id="16" idx="0"/>
-          </p:cNvCxnSpPr>
-          <p:nvPr/>
-        </p:nvCxnSpPr>
-        <p:spPr>
-          <a:xfrm>
-            <a:off x="11644437" y="4004817"/>
-            <a:ext cx="48261" cy="73706"/>
-          </a:xfrm>
-          <a:prstGeom prst="straightConnector1">
-            <a:avLst/>
-          </a:prstGeom>
-          <a:ln>
-            <a:tailEnd type="triangle"/>
-          </a:ln>
-        </p:spPr>
-        <p:style>
-          <a:lnRef idx="2">
-            <a:schemeClr val="accent1"/>
-          </a:lnRef>
-          <a:fillRef idx="0">
-            <a:schemeClr val="accent1"/>
-          </a:fillRef>
-          <a:effectRef idx="1">
-            <a:schemeClr val="accent1"/>
-          </a:effectRef>
-          <a:fontRef idx="minor">
-            <a:schemeClr val="tx1"/>
-          </a:fontRef>
-        </p:style>
-      </p:cxnSp>
-      <p:sp>
-        <p:nvSpPr>
-          <p:cNvPr id="17" name="Flowchart: Decision 16">
-            <a:extLst>
-              <a:ext uri="{FF2B5EF4-FFF2-40B4-BE49-F238E27FC236}">
-                <a16:creationId xmlns:a16="http://schemas.microsoft.com/office/drawing/2014/main" id="{ECA44BFA-BA3E-6A43-959C-AF6314590471}"/>
-              </a:ext>
-            </a:extLst>
-          </p:cNvPr>
-          <p:cNvSpPr/>
-          <p:nvPr/>
-        </p:nvSpPr>
-        <p:spPr>
-          <a:xfrm>
-            <a:off x="10898270" y="1691702"/>
-            <a:ext cx="1019085" cy="585482"/>
-          </a:xfrm>
-          <a:prstGeom prst="flowChartDecision">
-            <a:avLst/>
-          </a:prstGeom>
-        </p:spPr>
-        <p:style>
-          <a:lnRef idx="2">
-            <a:schemeClr val="accent6">
-              <a:shade val="15000"/>
-            </a:schemeClr>
-          </a:lnRef>
-          <a:fillRef idx="1">
-            <a:schemeClr val="accent6"/>
-          </a:fillRef>
-          <a:effectRef idx="0">
-            <a:schemeClr val="accent6"/>
-          </a:effectRef>
-          <a:fontRef idx="minor">
-            <a:schemeClr val="lt1"/>
-          </a:fontRef>
-        </p:style>
-        <p:txBody>
-          <a:bodyPr rtlCol="0" anchor="ctr"/>
-          <a:lstStyle/>
-          <a:p>
-            <a:pPr algn="ctr"/>
-            <a:r>
-              <a:rPr lang="en-US" sz="600" dirty="0"/>
-              <a:t>1 </a:t>
-            </a:r>
-            <a:r>
-              <a:rPr lang="en-US" sz="600" dirty="0" err="1"/>
-              <a:t>maintext</a:t>
-            </a:r>
-            <a:r>
-              <a:rPr lang="en-US" sz="600" dirty="0"/>
-              <a:t> display</a:t>
-            </a:r>
-            <a:endParaRPr lang="en-ZA" sz="600" dirty="0"/>
-          </a:p>
-        </p:txBody>
-      </p:sp>
-      <p:sp>
-        <p:nvSpPr>
-          <p:cNvPr id="22" name="Flowchart: Decision 21">
-            <a:extLst>
-              <a:ext uri="{FF2B5EF4-FFF2-40B4-BE49-F238E27FC236}">
-                <a16:creationId xmlns:a16="http://schemas.microsoft.com/office/drawing/2014/main" id="{A43D6DF6-59D6-11EA-8B30-D1877EAF42ED}"/>
-              </a:ext>
-            </a:extLst>
-          </p:cNvPr>
-          <p:cNvSpPr/>
-          <p:nvPr/>
-        </p:nvSpPr>
-        <p:spPr>
-          <a:xfrm>
-            <a:off x="10407846" y="2416110"/>
-            <a:ext cx="1019085" cy="585482"/>
-          </a:xfrm>
-          <a:prstGeom prst="flowChartDecision">
-            <a:avLst/>
-          </a:prstGeom>
-        </p:spPr>
-        <p:style>
-          <a:lnRef idx="2">
-            <a:schemeClr val="accent6">
-              <a:shade val="15000"/>
-            </a:schemeClr>
-          </a:lnRef>
-          <a:fillRef idx="1">
-            <a:schemeClr val="accent6"/>
-          </a:fillRef>
-          <a:effectRef idx="0">
-            <a:schemeClr val="accent6"/>
-          </a:effectRef>
-          <a:fontRef idx="minor">
-            <a:schemeClr val="lt1"/>
-          </a:fontRef>
-        </p:style>
-        <p:txBody>
-          <a:bodyPr rtlCol="0" anchor="ctr"/>
-          <a:lstStyle/>
-          <a:p>
-            <a:pPr algn="ctr"/>
-            <a:r>
-              <a:rPr lang="en-US" sz="600" dirty="0"/>
-              <a:t>2 data proc occ supp</a:t>
-            </a:r>
-            <a:endParaRPr lang="en-ZA" sz="600" dirty="0"/>
-          </a:p>
-        </p:txBody>
-      </p:sp>
-      <p:sp>
-        <p:nvSpPr>
-          <p:cNvPr id="23" name="Flowchart: Decision 22">
-            <a:extLst>
-              <a:ext uri="{FF2B5EF4-FFF2-40B4-BE49-F238E27FC236}">
-                <a16:creationId xmlns:a16="http://schemas.microsoft.com/office/drawing/2014/main" id="{3C1FE822-BB2C-035D-E698-95E1D50BA6A1}"/>
-              </a:ext>
-            </a:extLst>
-          </p:cNvPr>
-          <p:cNvSpPr/>
-          <p:nvPr/>
-        </p:nvSpPr>
-        <p:spPr>
-          <a:xfrm>
-            <a:off x="10135468" y="3995906"/>
-            <a:ext cx="1019085" cy="585482"/>
-          </a:xfrm>
-          <a:prstGeom prst="flowChartDecision">
-            <a:avLst/>
-          </a:prstGeom>
-        </p:spPr>
-        <p:style>
-          <a:lnRef idx="2">
-            <a:schemeClr val="accent6">
-              <a:shade val="15000"/>
-            </a:schemeClr>
-          </a:lnRef>
-          <a:fillRef idx="1">
-            <a:schemeClr val="accent6"/>
-          </a:fillRef>
-          <a:effectRef idx="0">
-            <a:schemeClr val="accent6"/>
-          </a:effectRef>
-          <a:fontRef idx="minor">
-            <a:schemeClr val="lt1"/>
-          </a:fontRef>
-        </p:style>
-        <p:txBody>
-          <a:bodyPr rtlCol="0" anchor="ctr"/>
-          <a:lstStyle/>
-          <a:p>
-            <a:pPr algn="ctr"/>
-            <a:r>
-              <a:rPr lang="en-US" sz="600" dirty="0"/>
-              <a:t>3 richness supp</a:t>
-            </a:r>
-            <a:endParaRPr lang="en-ZA" sz="600" dirty="0"/>
-          </a:p>
-        </p:txBody>
-      </p:sp>
-      <p:sp>
-        <p:nvSpPr>
-          <p:cNvPr id="24" name="Flowchart: Decision 23">
-            <a:extLst>
-              <a:ext uri="{FF2B5EF4-FFF2-40B4-BE49-F238E27FC236}">
-                <a16:creationId xmlns:a16="http://schemas.microsoft.com/office/drawing/2014/main" id="{CF27A413-A028-4204-4ACA-A6CF5D264854}"/>
-              </a:ext>
-            </a:extLst>
-          </p:cNvPr>
-          <p:cNvSpPr/>
-          <p:nvPr/>
-        </p:nvSpPr>
-        <p:spPr>
-          <a:xfrm>
-            <a:off x="10625352" y="5180015"/>
-            <a:ext cx="1019085" cy="585482"/>
-          </a:xfrm>
-          <a:prstGeom prst="flowChartDecision">
-            <a:avLst/>
-          </a:prstGeom>
-        </p:spPr>
-        <p:style>
-          <a:lnRef idx="2">
-            <a:schemeClr val="accent6">
-              <a:shade val="15000"/>
-            </a:schemeClr>
-          </a:lnRef>
-          <a:fillRef idx="1">
-            <a:schemeClr val="accent6"/>
-          </a:fillRef>
-          <a:effectRef idx="0">
-            <a:schemeClr val="accent6"/>
-          </a:effectRef>
-          <a:fontRef idx="minor">
-            <a:schemeClr val="lt1"/>
-          </a:fontRef>
-        </p:style>
-        <p:txBody>
-          <a:bodyPr rtlCol="0" anchor="ctr"/>
-          <a:lstStyle/>
-          <a:p>
-            <a:pPr algn="ctr"/>
-            <a:r>
-              <a:rPr lang="en-US" sz="600" dirty="0"/>
-              <a:t>4 zeta dec supp</a:t>
-            </a:r>
-            <a:endParaRPr lang="en-ZA" sz="600" dirty="0"/>
-          </a:p>
-        </p:txBody>
-      </p:sp>
-      <p:sp>
-        <p:nvSpPr>
-          <p:cNvPr id="38" name="Flowchart: Decision 37">
-            <a:extLst>
-              <a:ext uri="{FF2B5EF4-FFF2-40B4-BE49-F238E27FC236}">
-                <a16:creationId xmlns:a16="http://schemas.microsoft.com/office/drawing/2014/main" id="{B4BBD7DC-9A75-CD72-6F95-BB70A189230A}"/>
-              </a:ext>
-            </a:extLst>
-          </p:cNvPr>
-          <p:cNvSpPr/>
-          <p:nvPr/>
-        </p:nvSpPr>
-        <p:spPr>
-          <a:xfrm>
-            <a:off x="10982569" y="5940528"/>
-            <a:ext cx="1019085" cy="585482"/>
-          </a:xfrm>
-          <a:prstGeom prst="flowChartDecision">
-            <a:avLst/>
-          </a:prstGeom>
-        </p:spPr>
-        <p:style>
-          <a:lnRef idx="2">
-            <a:schemeClr val="accent6">
-              <a:shade val="15000"/>
-            </a:schemeClr>
-          </a:lnRef>
-          <a:fillRef idx="1">
-            <a:schemeClr val="accent6"/>
-          </a:fillRef>
-          <a:effectRef idx="0">
-            <a:schemeClr val="accent6"/>
-          </a:effectRef>
-          <a:fontRef idx="minor">
-            <a:schemeClr val="lt1"/>
-          </a:fontRef>
-        </p:style>
-        <p:txBody>
-          <a:bodyPr rtlCol="0" anchor="ctr"/>
-          <a:lstStyle/>
-          <a:p>
-            <a:pPr algn="ctr"/>
-            <a:r>
-              <a:rPr lang="en-US" sz="600" dirty="0"/>
-              <a:t>5 </a:t>
-            </a:r>
-            <a:r>
-              <a:rPr lang="en-US" sz="600" dirty="0" err="1"/>
-              <a:t>msgdm</a:t>
-            </a:r>
-            <a:r>
-              <a:rPr lang="en-US" sz="600" dirty="0"/>
-              <a:t> supp</a:t>
-            </a:r>
-            <a:endParaRPr lang="en-ZA" sz="600" dirty="0"/>
-          </a:p>
-        </p:txBody>
-      </p:sp>
-      <p:cxnSp>
-        <p:nvCxnSpPr>
-          <p:cNvPr id="43" name="Straight Arrow Connector 42">
-            <a:extLst>
-              <a:ext uri="{FF2B5EF4-FFF2-40B4-BE49-F238E27FC236}">
-                <a16:creationId xmlns:a16="http://schemas.microsoft.com/office/drawing/2014/main" id="{F47F30FB-1B91-8E60-F6E9-5F2AE119ED66}"/>
-              </a:ext>
-            </a:extLst>
-          </p:cNvPr>
-          <p:cNvCxnSpPr>
-            <a:cxnSpLocks/>
-            <a:stCxn id="17" idx="3"/>
-            <a:endCxn id="202" idx="1"/>
-          </p:cNvCxnSpPr>
-          <p:nvPr/>
-        </p:nvCxnSpPr>
-        <p:spPr>
-          <a:xfrm flipH="1">
-            <a:off x="11180784" y="1984443"/>
-            <a:ext cx="736571" cy="1646799"/>
-          </a:xfrm>
-          <a:prstGeom prst="straightConnector1">
-            <a:avLst/>
-          </a:prstGeom>
-          <a:ln>
-            <a:tailEnd type="triangle"/>
-          </a:ln>
-        </p:spPr>
-        <p:style>
-          <a:lnRef idx="2">
-            <a:schemeClr val="accent1"/>
-          </a:lnRef>
-          <a:fillRef idx="0">
-            <a:schemeClr val="accent1"/>
-          </a:fillRef>
-          <a:effectRef idx="1">
-            <a:schemeClr val="accent1"/>
-          </a:effectRef>
-          <a:fontRef idx="minor">
-            <a:schemeClr val="tx1"/>
-          </a:fontRef>
-        </p:style>
-      </p:cxnSp>
-      <p:cxnSp>
-        <p:nvCxnSpPr>
-          <p:cNvPr id="45" name="Straight Arrow Connector 44">
-            <a:extLst>
-              <a:ext uri="{FF2B5EF4-FFF2-40B4-BE49-F238E27FC236}">
-                <a16:creationId xmlns:a16="http://schemas.microsoft.com/office/drawing/2014/main" id="{2559B6B5-BA6E-3DB5-957A-742FB7757DC3}"/>
-              </a:ext>
-            </a:extLst>
-          </p:cNvPr>
-          <p:cNvCxnSpPr>
-            <a:cxnSpLocks/>
-            <a:stCxn id="23" idx="3"/>
-            <a:endCxn id="202" idx="1"/>
-          </p:cNvCxnSpPr>
-          <p:nvPr/>
-        </p:nvCxnSpPr>
-        <p:spPr>
-          <a:xfrm flipV="1">
-            <a:off x="11154553" y="3631242"/>
-            <a:ext cx="26231" cy="657405"/>
-          </a:xfrm>
-          <a:prstGeom prst="straightConnector1">
-            <a:avLst/>
-          </a:prstGeom>
-          <a:ln>
-            <a:tailEnd type="triangle"/>
-          </a:ln>
-        </p:spPr>
-        <p:style>
-          <a:lnRef idx="2">
-            <a:schemeClr val="accent1"/>
-          </a:lnRef>
-          <a:fillRef idx="0">
-            <a:schemeClr val="accent1"/>
-          </a:fillRef>
-          <a:effectRef idx="1">
-            <a:schemeClr val="accent1"/>
-          </a:effectRef>
-          <a:fontRef idx="minor">
-            <a:schemeClr val="tx1"/>
-          </a:fontRef>
-        </p:style>
-      </p:cxnSp>
-      <p:cxnSp>
-        <p:nvCxnSpPr>
-          <p:cNvPr id="46" name="Straight Arrow Connector 45">
-            <a:extLst>
-              <a:ext uri="{FF2B5EF4-FFF2-40B4-BE49-F238E27FC236}">
-                <a16:creationId xmlns:a16="http://schemas.microsoft.com/office/drawing/2014/main" id="{4964EB87-D675-0C54-FA75-583010EF91D1}"/>
-              </a:ext>
-            </a:extLst>
-          </p:cNvPr>
-          <p:cNvCxnSpPr>
-            <a:cxnSpLocks/>
-            <a:stCxn id="22" idx="2"/>
-            <a:endCxn id="202" idx="1"/>
-          </p:cNvCxnSpPr>
-          <p:nvPr/>
-        </p:nvCxnSpPr>
-        <p:spPr>
-          <a:xfrm>
-            <a:off x="10917389" y="3001592"/>
-            <a:ext cx="263395" cy="629650"/>
-          </a:xfrm>
-          <a:prstGeom prst="straightConnector1">
-            <a:avLst/>
-          </a:prstGeom>
-          <a:ln>
-            <a:tailEnd type="triangle"/>
-          </a:ln>
-        </p:spPr>
-        <p:style>
-          <a:lnRef idx="2">
-            <a:schemeClr val="accent1"/>
-          </a:lnRef>
-          <a:fillRef idx="0">
-            <a:schemeClr val="accent1"/>
-          </a:fillRef>
-          <a:effectRef idx="1">
-            <a:schemeClr val="accent1"/>
-          </a:effectRef>
-          <a:fontRef idx="minor">
-            <a:schemeClr val="tx1"/>
-          </a:fontRef>
-        </p:style>
-      </p:cxnSp>
-      <p:cxnSp>
-        <p:nvCxnSpPr>
-          <p:cNvPr id="47" name="Straight Arrow Connector 46">
-            <a:extLst>
-              <a:ext uri="{FF2B5EF4-FFF2-40B4-BE49-F238E27FC236}">
-                <a16:creationId xmlns:a16="http://schemas.microsoft.com/office/drawing/2014/main" id="{058381AD-B682-1222-9B76-644285E3134C}"/>
-              </a:ext>
-            </a:extLst>
-          </p:cNvPr>
-          <p:cNvCxnSpPr>
-            <a:cxnSpLocks/>
-            <a:stCxn id="24" idx="3"/>
-            <a:endCxn id="202" idx="1"/>
-          </p:cNvCxnSpPr>
-          <p:nvPr/>
-        </p:nvCxnSpPr>
-        <p:spPr>
-          <a:xfrm flipH="1" flipV="1">
-            <a:off x="11180784" y="3631242"/>
-            <a:ext cx="463653" cy="1841514"/>
-          </a:xfrm>
-          <a:prstGeom prst="straightConnector1">
-            <a:avLst/>
-          </a:prstGeom>
-          <a:ln>
-            <a:tailEnd type="triangle"/>
-          </a:ln>
-        </p:spPr>
-        <p:style>
-          <a:lnRef idx="2">
-            <a:schemeClr val="accent1"/>
-          </a:lnRef>
-          <a:fillRef idx="0">
-            <a:schemeClr val="accent1"/>
-          </a:fillRef>
-          <a:effectRef idx="1">
-            <a:schemeClr val="accent1"/>
-          </a:effectRef>
-          <a:fontRef idx="minor">
-            <a:schemeClr val="tx1"/>
-          </a:fontRef>
-        </p:style>
-      </p:cxnSp>
-      <p:cxnSp>
-        <p:nvCxnSpPr>
-          <p:cNvPr id="48" name="Straight Arrow Connector 47">
-            <a:extLst>
-              <a:ext uri="{FF2B5EF4-FFF2-40B4-BE49-F238E27FC236}">
-                <a16:creationId xmlns:a16="http://schemas.microsoft.com/office/drawing/2014/main" id="{90084AF2-7B38-E6DC-3C02-C07043380A61}"/>
-              </a:ext>
-            </a:extLst>
-          </p:cNvPr>
-          <p:cNvCxnSpPr>
-            <a:cxnSpLocks/>
-            <a:stCxn id="38" idx="3"/>
-            <a:endCxn id="202" idx="1"/>
-          </p:cNvCxnSpPr>
-          <p:nvPr/>
-        </p:nvCxnSpPr>
-        <p:spPr>
-          <a:xfrm flipH="1" flipV="1">
-            <a:off x="11180784" y="3631242"/>
-            <a:ext cx="820870" cy="2602027"/>
-          </a:xfrm>
-          <a:prstGeom prst="straightConnector1">
-            <a:avLst/>
-          </a:prstGeom>
-          <a:ln>
-            <a:tailEnd type="triangle"/>
-          </a:ln>
-        </p:spPr>
-        <p:style>
-          <a:lnRef idx="2">
-            <a:schemeClr val="accent1"/>
-          </a:lnRef>
-          <a:fillRef idx="0">
-            <a:schemeClr val="accent1"/>
-          </a:fillRef>
-          <a:effectRef idx="1">
-            <a:schemeClr val="accent1"/>
-          </a:effectRef>
-          <a:fontRef idx="minor">
-            <a:schemeClr val="tx1"/>
-          </a:fontRef>
-        </p:style>
-      </p:cxnSp>
-      <p:sp>
-        <p:nvSpPr>
-          <p:cNvPr id="81" name="Flowchart: Document 80">
-            <a:extLst>
-              <a:ext uri="{FF2B5EF4-FFF2-40B4-BE49-F238E27FC236}">
-                <a16:creationId xmlns:a16="http://schemas.microsoft.com/office/drawing/2014/main" id="{C8205EAA-A50D-EE98-A0AA-D4EF49011DD5}"/>
-              </a:ext>
-            </a:extLst>
-          </p:cNvPr>
-          <p:cNvSpPr/>
-          <p:nvPr/>
-        </p:nvSpPr>
-        <p:spPr>
-          <a:xfrm>
-            <a:off x="8849592" y="1490170"/>
-            <a:ext cx="928789" cy="385278"/>
-          </a:xfrm>
-          <a:prstGeom prst="flowChartDocument">
-            <a:avLst/>
-          </a:prstGeom>
-        </p:spPr>
-        <p:style>
-          <a:lnRef idx="2">
-            <a:schemeClr val="accent4">
-              <a:shade val="15000"/>
-            </a:schemeClr>
-          </a:lnRef>
-          <a:fillRef idx="1">
-            <a:schemeClr val="accent4"/>
-          </a:fillRef>
-          <a:effectRef idx="0">
-            <a:schemeClr val="accent4"/>
-          </a:effectRef>
-          <a:fontRef idx="minor">
-            <a:schemeClr val="lt1"/>
-          </a:fontRef>
-        </p:style>
-        <p:txBody>
-          <a:bodyPr rtlCol="0" anchor="ctr"/>
-          <a:lstStyle/>
-          <a:p>
-            <a:pPr algn="ctr"/>
-            <a:r>
-              <a:rPr lang="en-US" sz="500" dirty="0" err="1"/>
-              <a:t>Gamm_multipanel_figFig</a:t>
-            </a:r>
-            <a:r>
-              <a:rPr lang="en-US" sz="500" dirty="0"/>
-              <a:t>. 1 Hex_dens_transects_richness.png</a:t>
-            </a:r>
-          </a:p>
-          <a:p>
-            <a:pPr algn="ctr"/>
-            <a:r>
-              <a:rPr lang="en-ZA" sz="500" dirty="0"/>
-              <a:t>Fig: 2 all_env_vars.png</a:t>
-            </a:r>
-          </a:p>
-        </p:txBody>
-      </p:sp>
-      <p:cxnSp>
-        <p:nvCxnSpPr>
-          <p:cNvPr id="154" name="Straight Arrow Connector 153">
-            <a:extLst>
-              <a:ext uri="{FF2B5EF4-FFF2-40B4-BE49-F238E27FC236}">
-                <a16:creationId xmlns:a16="http://schemas.microsoft.com/office/drawing/2014/main" id="{1ACB76FB-C66D-1837-5213-4E390263AFEE}"/>
-              </a:ext>
-            </a:extLst>
-          </p:cNvPr>
-          <p:cNvCxnSpPr>
-            <a:cxnSpLocks/>
-            <a:stCxn id="206" idx="3"/>
-            <a:endCxn id="81" idx="1"/>
-          </p:cNvCxnSpPr>
-          <p:nvPr/>
-        </p:nvCxnSpPr>
-        <p:spPr>
-          <a:xfrm>
-            <a:off x="8498641" y="1632758"/>
-            <a:ext cx="350951" cy="50051"/>
-          </a:xfrm>
-          <a:prstGeom prst="straightConnector1">
-            <a:avLst/>
-          </a:prstGeom>
-          <a:ln>
-            <a:tailEnd type="triangle"/>
-          </a:ln>
-        </p:spPr>
-        <p:style>
-          <a:lnRef idx="2">
-            <a:schemeClr val="accent1"/>
-          </a:lnRef>
-          <a:fillRef idx="0">
-            <a:schemeClr val="accent1"/>
-          </a:fillRef>
-          <a:effectRef idx="1">
-            <a:schemeClr val="accent1"/>
-          </a:effectRef>
-          <a:fontRef idx="minor">
-            <a:schemeClr val="tx1"/>
-          </a:fontRef>
-        </p:style>
-      </p:cxnSp>
-      <p:cxnSp>
-        <p:nvCxnSpPr>
-          <p:cNvPr id="157" name="Straight Arrow Connector 156">
-            <a:extLst>
-              <a:ext uri="{FF2B5EF4-FFF2-40B4-BE49-F238E27FC236}">
-                <a16:creationId xmlns:a16="http://schemas.microsoft.com/office/drawing/2014/main" id="{7DA80BF1-5CC9-E4BA-6747-BBF3ED611F10}"/>
-              </a:ext>
-            </a:extLst>
-          </p:cNvPr>
-          <p:cNvCxnSpPr>
-            <a:cxnSpLocks/>
-            <a:stCxn id="81" idx="3"/>
-            <a:endCxn id="17" idx="1"/>
-          </p:cNvCxnSpPr>
-          <p:nvPr/>
-        </p:nvCxnSpPr>
-        <p:spPr>
-          <a:xfrm>
-            <a:off x="9778381" y="1682809"/>
-            <a:ext cx="1119889" cy="301634"/>
-          </a:xfrm>
-          <a:prstGeom prst="straightConnector1">
-            <a:avLst/>
-          </a:prstGeom>
-          <a:ln>
-            <a:tailEnd type="triangle"/>
-          </a:ln>
-        </p:spPr>
-        <p:style>
-          <a:lnRef idx="2">
-            <a:schemeClr val="accent1"/>
-          </a:lnRef>
-          <a:fillRef idx="0">
-            <a:schemeClr val="accent1"/>
-          </a:fillRef>
-          <a:effectRef idx="1">
-            <a:schemeClr val="accent1"/>
-          </a:effectRef>
-          <a:fontRef idx="minor">
-            <a:schemeClr val="tx1"/>
-          </a:fontRef>
-        </p:style>
-      </p:cxnSp>
-      <p:sp>
-        <p:nvSpPr>
-          <p:cNvPr id="163" name="Flowchart: Decision 162">
-            <a:extLst>
-              <a:ext uri="{FF2B5EF4-FFF2-40B4-BE49-F238E27FC236}">
-                <a16:creationId xmlns:a16="http://schemas.microsoft.com/office/drawing/2014/main" id="{0C1C90BF-A448-45EF-7D27-8F0D8D3A6759}"/>
-              </a:ext>
-            </a:extLst>
-          </p:cNvPr>
-          <p:cNvSpPr/>
-          <p:nvPr/>
-        </p:nvSpPr>
-        <p:spPr>
-          <a:xfrm>
-            <a:off x="7399453" y="2027529"/>
-            <a:ext cx="1099188" cy="601233"/>
-          </a:xfrm>
-          <a:prstGeom prst="flowChartDecision">
-            <a:avLst/>
-          </a:prstGeom>
-        </p:spPr>
-        <p:style>
-          <a:lnRef idx="2">
-            <a:schemeClr val="accent6">
-              <a:shade val="15000"/>
-            </a:schemeClr>
-          </a:lnRef>
-          <a:fillRef idx="1">
-            <a:schemeClr val="accent6"/>
-          </a:fillRef>
-          <a:effectRef idx="0">
-            <a:schemeClr val="accent6"/>
-          </a:effectRef>
-          <a:fontRef idx="minor">
-            <a:schemeClr val="lt1"/>
-          </a:fontRef>
-        </p:style>
-        <p:txBody>
-          <a:bodyPr rtlCol="0" anchor="ctr"/>
-          <a:lstStyle/>
-          <a:p>
-            <a:pPr algn="ctr"/>
-            <a:r>
-              <a:rPr lang="en-ZA" sz="700" dirty="0" err="1"/>
-              <a:t>Gamm_multipanel_fig.Rmd</a:t>
-            </a:r>
-            <a:endParaRPr lang="en-ZA" sz="700" dirty="0"/>
-          </a:p>
-        </p:txBody>
-      </p:sp>
-      <p:sp>
-        <p:nvSpPr>
-          <p:cNvPr id="164" name="Flowchart: Document 163">
-            <a:extLst>
-              <a:ext uri="{FF2B5EF4-FFF2-40B4-BE49-F238E27FC236}">
-                <a16:creationId xmlns:a16="http://schemas.microsoft.com/office/drawing/2014/main" id="{BB58F0F7-9298-2A66-FB2D-9E967F9C23BE}"/>
-              </a:ext>
-            </a:extLst>
-          </p:cNvPr>
-          <p:cNvSpPr/>
-          <p:nvPr/>
-        </p:nvSpPr>
-        <p:spPr>
-          <a:xfrm>
-            <a:off x="8849591" y="1990784"/>
-            <a:ext cx="928789" cy="385278"/>
-          </a:xfrm>
-          <a:prstGeom prst="flowChartDocument">
-            <a:avLst/>
-          </a:prstGeom>
-        </p:spPr>
-        <p:style>
-          <a:lnRef idx="2">
-            <a:schemeClr val="accent4">
-              <a:shade val="15000"/>
-            </a:schemeClr>
-          </a:lnRef>
-          <a:fillRef idx="1">
-            <a:schemeClr val="accent4"/>
-          </a:fillRef>
-          <a:effectRef idx="0">
-            <a:schemeClr val="accent4"/>
-          </a:effectRef>
-          <a:fontRef idx="minor">
-            <a:schemeClr val="lt1"/>
-          </a:fontRef>
-        </p:style>
-        <p:txBody>
-          <a:bodyPr rtlCol="0" anchor="ctr"/>
-          <a:lstStyle/>
-          <a:p>
-            <a:pPr algn="ctr"/>
-            <a:r>
-              <a:rPr lang="en-US" sz="500" dirty="0"/>
-              <a:t>Fig. 3 gam_multiplot.png</a:t>
-            </a:r>
-            <a:endParaRPr lang="en-ZA" sz="500" dirty="0"/>
-          </a:p>
-        </p:txBody>
-      </p:sp>
-      <p:cxnSp>
-        <p:nvCxnSpPr>
-          <p:cNvPr id="165" name="Straight Arrow Connector 164">
-            <a:extLst>
-              <a:ext uri="{FF2B5EF4-FFF2-40B4-BE49-F238E27FC236}">
-                <a16:creationId xmlns:a16="http://schemas.microsoft.com/office/drawing/2014/main" id="{E72C594A-A558-2B7A-8F2B-5B3A1786B768}"/>
-              </a:ext>
-            </a:extLst>
-          </p:cNvPr>
-          <p:cNvCxnSpPr>
-            <a:cxnSpLocks/>
-            <a:stCxn id="163" idx="3"/>
-            <a:endCxn id="164" idx="1"/>
-          </p:cNvCxnSpPr>
-          <p:nvPr/>
-        </p:nvCxnSpPr>
-        <p:spPr>
-          <a:xfrm flipV="1">
-            <a:off x="8498641" y="2183423"/>
-            <a:ext cx="350950" cy="144723"/>
-          </a:xfrm>
-          <a:prstGeom prst="straightConnector1">
-            <a:avLst/>
-          </a:prstGeom>
-          <a:ln>
-            <a:tailEnd type="triangle"/>
-          </a:ln>
-        </p:spPr>
-        <p:style>
-          <a:lnRef idx="2">
-            <a:schemeClr val="accent1"/>
-          </a:lnRef>
-          <a:fillRef idx="0">
-            <a:schemeClr val="accent1"/>
-          </a:fillRef>
-          <a:effectRef idx="1">
-            <a:schemeClr val="accent1"/>
-          </a:effectRef>
-          <a:fontRef idx="minor">
-            <a:schemeClr val="tx1"/>
-          </a:fontRef>
-        </p:style>
-      </p:cxnSp>
-      <p:cxnSp>
-        <p:nvCxnSpPr>
-          <p:cNvPr id="174" name="Straight Arrow Connector 173">
-            <a:extLst>
-              <a:ext uri="{FF2B5EF4-FFF2-40B4-BE49-F238E27FC236}">
-                <a16:creationId xmlns:a16="http://schemas.microsoft.com/office/drawing/2014/main" id="{4916695C-C3C1-D583-F5FE-131631F95A38}"/>
-              </a:ext>
-            </a:extLst>
-          </p:cNvPr>
-          <p:cNvCxnSpPr>
-            <a:cxnSpLocks/>
-            <a:stCxn id="164" idx="3"/>
-            <a:endCxn id="17" idx="1"/>
-          </p:cNvCxnSpPr>
-          <p:nvPr/>
-        </p:nvCxnSpPr>
-        <p:spPr>
-          <a:xfrm flipV="1">
-            <a:off x="9778380" y="1984443"/>
-            <a:ext cx="1119890" cy="198980"/>
-          </a:xfrm>
-          <a:prstGeom prst="straightConnector1">
-            <a:avLst/>
-          </a:prstGeom>
-          <a:ln>
-            <a:tailEnd type="triangle"/>
-          </a:ln>
-        </p:spPr>
-        <p:style>
-          <a:lnRef idx="2">
-            <a:schemeClr val="accent1"/>
-          </a:lnRef>
-          <a:fillRef idx="0">
-            <a:schemeClr val="accent1"/>
-          </a:fillRef>
-          <a:effectRef idx="1">
-            <a:schemeClr val="accent1"/>
-          </a:effectRef>
-          <a:fontRef idx="minor">
-            <a:schemeClr val="tx1"/>
-          </a:fontRef>
-        </p:style>
-      </p:cxnSp>
+        </p:txBody>
+      </p:sp>
     </p:spTree>
     <p:extLst>
       <p:ext uri="{BB962C8B-B14F-4D97-AF65-F5344CB8AC3E}">

</xml_diff>

<commit_message>
Added multiplot for msgms to pptx
</commit_message>
<xml_diff>
--- a/script_relationships.pptx
+++ b/script_relationships.pptx
@@ -261,7 +261,7 @@
           <a:p>
             <a:fld id="{0E339DDD-9EE9-44F5-8997-0932F1FFC27B}" type="datetimeFigureOut">
               <a:rPr lang="en-ZA" smtClean="0"/>
-              <a:t>2024/10/22</a:t>
+              <a:t>2025/01/22</a:t>
             </a:fld>
             <a:endParaRPr lang="en-ZA"/>
           </a:p>
@@ -461,7 +461,7 @@
           <a:p>
             <a:fld id="{0E339DDD-9EE9-44F5-8997-0932F1FFC27B}" type="datetimeFigureOut">
               <a:rPr lang="en-ZA" smtClean="0"/>
-              <a:t>2024/10/22</a:t>
+              <a:t>2025/01/22</a:t>
             </a:fld>
             <a:endParaRPr lang="en-ZA"/>
           </a:p>
@@ -671,7 +671,7 @@
           <a:p>
             <a:fld id="{0E339DDD-9EE9-44F5-8997-0932F1FFC27B}" type="datetimeFigureOut">
               <a:rPr lang="en-ZA" smtClean="0"/>
-              <a:t>2024/10/22</a:t>
+              <a:t>2025/01/22</a:t>
             </a:fld>
             <a:endParaRPr lang="en-ZA"/>
           </a:p>
@@ -871,7 +871,7 @@
           <a:p>
             <a:fld id="{0E339DDD-9EE9-44F5-8997-0932F1FFC27B}" type="datetimeFigureOut">
               <a:rPr lang="en-ZA" smtClean="0"/>
-              <a:t>2024/10/22</a:t>
+              <a:t>2025/01/22</a:t>
             </a:fld>
             <a:endParaRPr lang="en-ZA"/>
           </a:p>
@@ -1147,7 +1147,7 @@
           <a:p>
             <a:fld id="{0E339DDD-9EE9-44F5-8997-0932F1FFC27B}" type="datetimeFigureOut">
               <a:rPr lang="en-ZA" smtClean="0"/>
-              <a:t>2024/10/22</a:t>
+              <a:t>2025/01/22</a:t>
             </a:fld>
             <a:endParaRPr lang="en-ZA"/>
           </a:p>
@@ -1415,7 +1415,7 @@
           <a:p>
             <a:fld id="{0E339DDD-9EE9-44F5-8997-0932F1FFC27B}" type="datetimeFigureOut">
               <a:rPr lang="en-ZA" smtClean="0"/>
-              <a:t>2024/10/22</a:t>
+              <a:t>2025/01/22</a:t>
             </a:fld>
             <a:endParaRPr lang="en-ZA"/>
           </a:p>
@@ -1830,7 +1830,7 @@
           <a:p>
             <a:fld id="{0E339DDD-9EE9-44F5-8997-0932F1FFC27B}" type="datetimeFigureOut">
               <a:rPr lang="en-ZA" smtClean="0"/>
-              <a:t>2024/10/22</a:t>
+              <a:t>2025/01/22</a:t>
             </a:fld>
             <a:endParaRPr lang="en-ZA"/>
           </a:p>
@@ -1972,7 +1972,7 @@
           <a:p>
             <a:fld id="{0E339DDD-9EE9-44F5-8997-0932F1FFC27B}" type="datetimeFigureOut">
               <a:rPr lang="en-ZA" smtClean="0"/>
-              <a:t>2024/10/22</a:t>
+              <a:t>2025/01/22</a:t>
             </a:fld>
             <a:endParaRPr lang="en-ZA"/>
           </a:p>
@@ -2085,7 +2085,7 @@
           <a:p>
             <a:fld id="{0E339DDD-9EE9-44F5-8997-0932F1FFC27B}" type="datetimeFigureOut">
               <a:rPr lang="en-ZA" smtClean="0"/>
-              <a:t>2024/10/22</a:t>
+              <a:t>2025/01/22</a:t>
             </a:fld>
             <a:endParaRPr lang="en-ZA"/>
           </a:p>
@@ -2398,7 +2398,7 @@
           <a:p>
             <a:fld id="{0E339DDD-9EE9-44F5-8997-0932F1FFC27B}" type="datetimeFigureOut">
               <a:rPr lang="en-ZA" smtClean="0"/>
-              <a:t>2024/10/22</a:t>
+              <a:t>2025/01/22</a:t>
             </a:fld>
             <a:endParaRPr lang="en-ZA"/>
           </a:p>
@@ -2687,7 +2687,7 @@
           <a:p>
             <a:fld id="{0E339DDD-9EE9-44F5-8997-0932F1FFC27B}" type="datetimeFigureOut">
               <a:rPr lang="en-ZA" smtClean="0"/>
-              <a:t>2024/10/22</a:t>
+              <a:t>2025/01/22</a:t>
             </a:fld>
             <a:endParaRPr lang="en-ZA"/>
           </a:p>
@@ -2930,7 +2930,7 @@
           <a:p>
             <a:fld id="{0E339DDD-9EE9-44F5-8997-0932F1FFC27B}" type="datetimeFigureOut">
               <a:rPr lang="en-ZA" smtClean="0"/>
-              <a:t>2024/10/22</a:t>
+              <a:t>2025/01/22</a:t>
             </a:fld>
             <a:endParaRPr lang="en-ZA"/>
           </a:p>
@@ -7356,6 +7356,142 @@
           </a:p>
         </p:txBody>
       </p:sp>
+      <p:sp>
+        <p:nvSpPr>
+          <p:cNvPr id="7" name="Flowchart: Document 6">
+            <a:extLst>
+              <a:ext uri="{FF2B5EF4-FFF2-40B4-BE49-F238E27FC236}">
+                <a16:creationId xmlns:a16="http://schemas.microsoft.com/office/drawing/2014/main" id="{9AEFFEBE-CBE1-A4D4-8ECC-60156AC8FCA4}"/>
+              </a:ext>
+            </a:extLst>
+          </p:cNvPr>
+          <p:cNvSpPr/>
+          <p:nvPr/>
+        </p:nvSpPr>
+        <p:spPr>
+          <a:xfrm>
+            <a:off x="9014949" y="5235550"/>
+            <a:ext cx="928789" cy="385278"/>
+          </a:xfrm>
+          <a:prstGeom prst="flowChartDocument">
+            <a:avLst/>
+          </a:prstGeom>
+        </p:spPr>
+        <p:style>
+          <a:lnRef idx="2">
+            <a:schemeClr val="accent4">
+              <a:shade val="15000"/>
+            </a:schemeClr>
+          </a:lnRef>
+          <a:fillRef idx="1">
+            <a:schemeClr val="accent4"/>
+          </a:fillRef>
+          <a:effectRef idx="0">
+            <a:schemeClr val="accent4"/>
+          </a:effectRef>
+          <a:fontRef idx="minor">
+            <a:schemeClr val="lt1"/>
+          </a:fontRef>
+        </p:style>
+        <p:txBody>
+          <a:bodyPr rtlCol="0" anchor="ctr"/>
+          <a:lstStyle/>
+          <a:p>
+            <a:pPr algn="ctr"/>
+            <a:r>
+              <a:rPr lang="en-US" sz="500" dirty="0"/>
+              <a:t>Fig. 4 msgdm_multiplot.png</a:t>
+            </a:r>
+            <a:endParaRPr lang="en-ZA" sz="500" dirty="0"/>
+          </a:p>
+        </p:txBody>
+      </p:sp>
+      <p:cxnSp>
+        <p:nvCxnSpPr>
+          <p:cNvPr id="12" name="Straight Arrow Connector 11">
+            <a:extLst>
+              <a:ext uri="{FF2B5EF4-FFF2-40B4-BE49-F238E27FC236}">
+                <a16:creationId xmlns:a16="http://schemas.microsoft.com/office/drawing/2014/main" id="{55EC813B-0353-53B5-8D12-1B60AE18DF84}"/>
+              </a:ext>
+            </a:extLst>
+          </p:cNvPr>
+          <p:cNvCxnSpPr>
+            <a:cxnSpLocks/>
+            <a:stCxn id="3" idx="3"/>
+            <a:endCxn id="7" idx="1"/>
+          </p:cNvCxnSpPr>
+          <p:nvPr/>
+        </p:nvCxnSpPr>
+        <p:spPr>
+          <a:xfrm flipV="1">
+            <a:off x="8526874" y="5428189"/>
+            <a:ext cx="488075" cy="8490"/>
+          </a:xfrm>
+          <a:prstGeom prst="straightConnector1">
+            <a:avLst/>
+          </a:prstGeom>
+          <a:ln>
+            <a:tailEnd type="triangle"/>
+          </a:ln>
+        </p:spPr>
+        <p:style>
+          <a:lnRef idx="2">
+            <a:schemeClr val="accent1"/>
+          </a:lnRef>
+          <a:fillRef idx="0">
+            <a:schemeClr val="accent1"/>
+          </a:fillRef>
+          <a:effectRef idx="1">
+            <a:schemeClr val="accent1"/>
+          </a:effectRef>
+          <a:fontRef idx="minor">
+            <a:schemeClr val="tx1"/>
+          </a:fontRef>
+        </p:style>
+      </p:cxnSp>
+      <p:cxnSp>
+        <p:nvCxnSpPr>
+          <p:cNvPr id="19" name="Straight Arrow Connector 18">
+            <a:extLst>
+              <a:ext uri="{FF2B5EF4-FFF2-40B4-BE49-F238E27FC236}">
+                <a16:creationId xmlns:a16="http://schemas.microsoft.com/office/drawing/2014/main" id="{218706CF-2250-D4A4-49BC-445A9BA75011}"/>
+              </a:ext>
+            </a:extLst>
+          </p:cNvPr>
+          <p:cNvCxnSpPr>
+            <a:cxnSpLocks/>
+            <a:stCxn id="7" idx="3"/>
+            <a:endCxn id="17" idx="1"/>
+          </p:cNvCxnSpPr>
+          <p:nvPr/>
+        </p:nvCxnSpPr>
+        <p:spPr>
+          <a:xfrm flipV="1">
+            <a:off x="9943738" y="1984443"/>
+            <a:ext cx="954532" cy="3443746"/>
+          </a:xfrm>
+          <a:prstGeom prst="straightConnector1">
+            <a:avLst/>
+          </a:prstGeom>
+          <a:ln>
+            <a:tailEnd type="triangle"/>
+          </a:ln>
+        </p:spPr>
+        <p:style>
+          <a:lnRef idx="2">
+            <a:schemeClr val="accent1"/>
+          </a:lnRef>
+          <a:fillRef idx="0">
+            <a:schemeClr val="accent1"/>
+          </a:fillRef>
+          <a:effectRef idx="1">
+            <a:schemeClr val="accent1"/>
+          </a:effectRef>
+          <a:fontRef idx="minor">
+            <a:schemeClr val="tx1"/>
+          </a:fontRef>
+        </p:style>
+      </p:cxnSp>
     </p:spTree>
     <p:extLst>
       <p:ext uri="{BB962C8B-B14F-4D97-AF65-F5344CB8AC3E}">

</xml_diff>